<commit_message>
Updated slides to point to github repo with example ros code
</commit_message>
<xml_diff>
--- a/website/tutorials/Tutorial1_ROS.pptx
+++ b/website/tutorials/Tutorial1_ROS.pptx
@@ -31,6 +31,7 @@
     <p:sldId id="278" r:id="rId26"/>
     <p:sldId id="279" r:id="rId27"/>
     <p:sldId id="280" r:id="rId28"/>
+    <p:sldId id="281" r:id="rId29"/>
   </p:sldIdLst>
   <p:sldSz cx="10080625" cy="7559675"/>
   <p:notesSz cx="7559675" cy="10691812"/>
@@ -3161,7 +3162,7 @@
           <a:bodyPr lIns="0" rIns="0" tIns="0" bIns="0"/>
           <a:p>
             <a:pPr algn="r"/>
-            <a:fld id="{CEAEECB7-4CC4-4F82-933D-5E29AC3513CC}" type="slidenum">
+            <a:fld id="{03C08168-EB2F-4C10-B931-40D103364704}" type="slidenum">
               <a:rPr b="0" lang="en-CA" sz="1400" spc="-1" strike="noStrike">
                 <a:latin typeface="Noto Sans Regular"/>
               </a:rPr>
@@ -3173,11 +3174,11 @@
               </a:rPr>
               <a:t> / </a:t>
             </a:r>
-            <a:fld id="{AFE79F07-6A93-46E8-A2F1-B2C664C0A195}" type="slidecount">
+            <a:fld id="{36A28933-4E66-413E-B757-4545E1C5F513}" type="slidecount">
               <a:rPr b="0" lang="en-CA" sz="1400" spc="-1" strike="noStrike">
                 <a:latin typeface="Noto Sans Regular"/>
               </a:rPr>
-              <a:t>25</a:t>
+              <a:t>26</a:t>
             </a:fld>
             <a:endParaRPr b="0" lang="en-CA" sz="1400" spc="-1" strike="noStrike">
               <a:latin typeface="Noto Sans Regular"/>
@@ -3535,7 +3536,7 @@
               <a:rPr b="0" lang="en-CA" sz="1400" spc="-1" strike="noStrike">
                 <a:latin typeface="Noto Sans Regular"/>
               </a:rPr>
-              <a:t> </a:t>
+              <a:t>&lt;date/time&gt;</a:t>
             </a:r>
             <a:endParaRPr b="0" lang="en-CA" sz="1400" spc="-1" strike="noStrike">
               <a:latin typeface="Noto Sans Regular"/>
@@ -3570,7 +3571,7 @@
               <a:rPr b="0" lang="en-CA" sz="1400" spc="-1" strike="noStrike">
                 <a:latin typeface="Noto Sans Regular"/>
               </a:rPr>
-              <a:t> </a:t>
+              <a:t>&lt;footer&gt;</a:t>
             </a:r>
             <a:endParaRPr b="0" lang="en-CA" sz="1400" spc="-1" strike="noStrike">
               <a:latin typeface="Noto Sans Regular"/>
@@ -3601,11 +3602,11 @@
           <a:bodyPr lIns="0" rIns="0" tIns="0" bIns="0"/>
           <a:p>
             <a:pPr algn="r"/>
-            <a:fld id="{EC22BA0E-F812-422C-92A9-BB846A591890}" type="slidenum">
+            <a:fld id="{D0031A4B-0B78-47AE-BBB7-C486DD1BCB43}" type="slidenum">
               <a:rPr b="0" lang="en-CA" sz="1400" spc="-1" strike="noStrike">
                 <a:latin typeface="Noto Sans Regular"/>
               </a:rPr>
-              <a:t>1</a:t>
+              <a:t>&lt;number&gt;</a:t>
             </a:fld>
             <a:r>
               <a:rPr b="0" lang="en-CA" sz="1400" spc="-1" strike="noStrike">
@@ -3613,11 +3614,11 @@
               </a:rPr>
               <a:t> / </a:t>
             </a:r>
-            <a:fld id="{10B9F32D-00B2-4D97-8511-0535A517487D}" type="slidecount">
+            <a:fld id="{0F38D286-8C53-4FED-B6E6-D59DE89E19AF}" type="slidecount">
               <a:rPr b="0" lang="en-CA" sz="1400" spc="-1" strike="noStrike">
                 <a:latin typeface="Noto Sans Regular"/>
               </a:rPr>
-              <a:t>25</a:t>
+              <a:t>26</a:t>
             </a:fld>
             <a:endParaRPr b="0" lang="en-CA" sz="1400" spc="-1" strike="noStrike">
               <a:latin typeface="Noto Sans Regular"/>
@@ -3763,8 +3764,8 @@
         </p:nvSpPr>
         <p:spPr>
           <a:xfrm>
-            <a:off x="720000" y="2592000"/>
-            <a:ext cx="8568000" cy="1033920"/>
+            <a:off x="720000" y="2401560"/>
+            <a:ext cx="8568000" cy="982440"/>
           </a:xfrm>
           <a:prstGeom prst="rect">
             <a:avLst/>
@@ -3802,12 +3803,6 @@
               </a:rPr>
               <a:t>September 19, 2019</a:t>
             </a:r>
-            <a:endParaRPr b="0" lang="en-CA" sz="2200" spc="-1" strike="noStrike">
-              <a:latin typeface="Noto Sans Regular"/>
-            </a:endParaRPr>
-          </a:p>
-          <a:p>
-            <a:pPr algn="ctr"/>
             <a:endParaRPr b="0" lang="en-CA" sz="2200" spc="-1" strike="noStrike">
               <a:latin typeface="Noto Sans Regular"/>
             </a:endParaRPr>
@@ -3839,33 +3834,6 @@
       </p:pic>
     </p:spTree>
   </p:cSld>
-  <p:timing>
-    <p:tnLst>
-      <p:par>
-        <p:cTn id="1" dur="indefinite" restart="never" nodeType="tmRoot">
-          <p:childTnLst>
-            <p:seq>
-              <p:cTn id="2" dur="indefinite" nodeType="mainSeq"/>
-              <p:prevCondLst>
-                <p:cond delay="0" evt="onPrev">
-                  <p:tgtEl>
-                    <p:sldTgt/>
-                  </p:tgtEl>
-                </p:cond>
-              </p:prevCondLst>
-              <p:nextCondLst>
-                <p:cond delay="0" evt="onNext">
-                  <p:tgtEl>
-                    <p:sldTgt/>
-                  </p:tgtEl>
-                </p:cond>
-              </p:nextCondLst>
-            </p:seq>
-          </p:childTnLst>
-        </p:cTn>
-      </p:par>
-    </p:tnLst>
-  </p:timing>
 </p:sld>
 </file>
 
@@ -3888,7 +3856,7 @@
       </p:grpSpPr>
       <p:sp>
         <p:nvSpPr>
-          <p:cNvPr id="117" name="TextShape 1"/>
+          <p:cNvPr id="116" name="TextShape 1"/>
           <p:cNvSpPr txBox="1"/>
           <p:nvPr/>
         </p:nvSpPr>
@@ -3915,7 +3883,7 @@
                 </a:solidFill>
                 <a:latin typeface="Noto Sans Regular"/>
               </a:rPr>
-              <a:t>Action Clients/Servers</a:t>
+              <a:t>Services</a:t>
             </a:r>
             <a:endParaRPr b="1" lang="en-CA" sz="4400" spc="-1" strike="noStrike">
               <a:solidFill>
@@ -3928,7 +3896,7 @@
       </p:sp>
       <p:sp>
         <p:nvSpPr>
-          <p:cNvPr id="118" name="TextShape 2"/>
+          <p:cNvPr id="117" name="TextShape 2"/>
           <p:cNvSpPr txBox="1"/>
           <p:nvPr/>
         </p:nvSpPr>
@@ -3966,7 +3934,7 @@
                 </a:solidFill>
                 <a:latin typeface="Noto Sans Regular"/>
               </a:rPr>
-              <a:t>Actions trigger asynchronous tasks</a:t>
+              <a:t>Request / Response communication paradigm</a:t>
             </a:r>
             <a:endParaRPr b="0" lang="en-CA" sz="2600" spc="-1" strike="noStrike">
               <a:solidFill>
@@ -3994,7 +3962,25 @@
                 </a:solidFill>
                 <a:latin typeface="Noto Sans Regular"/>
               </a:rPr>
-              <a:t>Client code receives async, non-blocking callbacks with status updates.</a:t>
+              <a:t>Request will </a:t>
+            </a:r>
+            <a:r>
+              <a:rPr b="1" lang="en-CA" sz="2600" spc="-1" strike="noStrike">
+                <a:solidFill>
+                  <a:srgbClr val="333333"/>
+                </a:solidFill>
+                <a:latin typeface="Noto Sans Regular"/>
+              </a:rPr>
+              <a:t>block</a:t>
+            </a:r>
+            <a:r>
+              <a:rPr b="0" lang="en-CA" sz="2600" spc="-1" strike="noStrike">
+                <a:solidFill>
+                  <a:srgbClr val="333333"/>
+                </a:solidFill>
+                <a:latin typeface="Noto Sans Regular"/>
+              </a:rPr>
+              <a:t> will response is received</a:t>
             </a:r>
             <a:endParaRPr b="0" lang="en-CA" sz="2600" spc="-1" strike="noStrike">
               <a:solidFill>
@@ -4007,7 +3993,7 @@
       </p:sp>
       <p:pic>
         <p:nvPicPr>
-          <p:cNvPr id="119" name="" descr=""/>
+          <p:cNvPr id="118" name="" descr=""/>
           <p:cNvPicPr/>
           <p:nvPr/>
         </p:nvPicPr>
@@ -4016,9 +4002,9 @@
           <a:stretch/>
         </p:blipFill>
         <p:spPr>
-          <a:xfrm>
-            <a:off x="864000" y="3168000"/>
-            <a:ext cx="8064000" cy="2809080"/>
+          <a:xfrm rot="21588000">
+            <a:off x="2238120" y="3106440"/>
+            <a:ext cx="6092280" cy="3590640"/>
           </a:xfrm>
           <a:prstGeom prst="rect">
             <a:avLst/>
@@ -4052,7 +4038,7 @@
       </p:grpSpPr>
       <p:sp>
         <p:nvSpPr>
-          <p:cNvPr id="120" name="TextShape 1"/>
+          <p:cNvPr id="119" name="TextShape 1"/>
           <p:cNvSpPr txBox="1"/>
           <p:nvPr/>
         </p:nvSpPr>
@@ -4079,9 +4065,88 @@
                 </a:solidFill>
                 <a:latin typeface="Noto Sans Regular"/>
               </a:rPr>
-              <a:t>Anatony of a ROS Project</a:t>
+              <a:t>Action Clients/Servers</a:t>
             </a:r>
             <a:endParaRPr b="1" lang="en-CA" sz="4400" spc="-1" strike="noStrike">
+              <a:solidFill>
+                <a:srgbClr val="333333"/>
+              </a:solidFill>
+              <a:latin typeface="Noto Sans Regular"/>
+            </a:endParaRPr>
+          </a:p>
+        </p:txBody>
+      </p:sp>
+      <p:sp>
+        <p:nvSpPr>
+          <p:cNvPr id="120" name="TextShape 2"/>
+          <p:cNvSpPr txBox="1"/>
+          <p:nvPr/>
+        </p:nvSpPr>
+        <p:spPr>
+          <a:xfrm>
+            <a:off x="504000" y="1563480"/>
+            <a:ext cx="9216000" cy="1604520"/>
+          </a:xfrm>
+          <a:prstGeom prst="rect">
+            <a:avLst/>
+          </a:prstGeom>
+          <a:noFill/>
+          <a:ln>
+            <a:noFill/>
+          </a:ln>
+        </p:spPr>
+        <p:txBody>
+          <a:bodyPr lIns="0" rIns="0" tIns="0" bIns="0"/>
+          <a:p>
+            <a:pPr marL="432000" indent="-324000">
+              <a:spcAft>
+                <a:spcPts val="1414"/>
+              </a:spcAft>
+              <a:buClr>
+                <a:srgbClr val="ef2929"/>
+              </a:buClr>
+              <a:buSzPct val="45000"/>
+              <a:buFont typeface="Wingdings" charset="2"/>
+              <a:buChar char=""/>
+            </a:pPr>
+            <a:r>
+              <a:rPr b="0" lang="en-CA" sz="2600" spc="-1" strike="noStrike">
+                <a:solidFill>
+                  <a:srgbClr val="333333"/>
+                </a:solidFill>
+                <a:latin typeface="Noto Sans Regular"/>
+              </a:rPr>
+              <a:t>Actions trigger asynchronous tasks</a:t>
+            </a:r>
+            <a:endParaRPr b="0" lang="en-CA" sz="2600" spc="-1" strike="noStrike">
+              <a:solidFill>
+                <a:srgbClr val="333333"/>
+              </a:solidFill>
+              <a:latin typeface="Noto Sans Regular"/>
+            </a:endParaRPr>
+          </a:p>
+          <a:p>
+            <a:pPr marL="432000" indent="-324000">
+              <a:spcAft>
+                <a:spcPts val="1414"/>
+              </a:spcAft>
+              <a:buClr>
+                <a:srgbClr val="ef2929"/>
+              </a:buClr>
+              <a:buSzPct val="45000"/>
+              <a:buFont typeface="Wingdings" charset="2"/>
+              <a:buChar char=""/>
+            </a:pPr>
+            <a:r>
+              <a:rPr b="0" lang="en-CA" sz="2600" spc="-1" strike="noStrike">
+                <a:solidFill>
+                  <a:srgbClr val="333333"/>
+                </a:solidFill>
+                <a:latin typeface="Noto Sans Regular"/>
+              </a:rPr>
+              <a:t>Client code receives async, non-blocking callbacks with status updates.</a:t>
+            </a:r>
+            <a:endParaRPr b="0" lang="en-CA" sz="2600" spc="-1" strike="noStrike">
               <a:solidFill>
                 <a:srgbClr val="333333"/>
               </a:solidFill>
@@ -4102,8 +4167,8 @@
         </p:blipFill>
         <p:spPr>
           <a:xfrm>
-            <a:off x="617760" y="1833840"/>
-            <a:ext cx="2838240" cy="1190160"/>
+            <a:off x="864000" y="3168000"/>
+            <a:ext cx="8064000" cy="2809080"/>
           </a:xfrm>
           <a:prstGeom prst="rect">
             <a:avLst/>
@@ -4113,9 +4178,94 @@
           </a:ln>
         </p:spPr>
       </p:pic>
+    </p:spTree>
+  </p:cSld>
+</p:sld>
+</file>
+
+<file path=ppt/slides/slide12.xml><?xml version="1.0" encoding="utf-8"?>
+<p:sld xmlns:a="http://schemas.openxmlformats.org/drawingml/2006/main" xmlns:p="http://schemas.openxmlformats.org/presentationml/2006/main" xmlns:r="http://schemas.openxmlformats.org/officeDocument/2006/relationships" xmlns:p14="http://schemas.microsoft.com/office/powerpoint/2010/main" xmlns:p15="http://schemas.microsoft.com/office/powerpoint/2012/main" xmlns:mc="http://schemas.openxmlformats.org/markup-compatibility/2006">
+  <p:cSld>
+    <p:spTree>
+      <p:nvGrpSpPr>
+        <p:cNvPr id="1" name=""/>
+        <p:cNvGrpSpPr/>
+        <p:nvPr/>
+      </p:nvGrpSpPr>
+      <p:grpSpPr>
+        <a:xfrm>
+          <a:off x="0" y="0"/>
+          <a:ext cx="0" cy="0"/>
+          <a:chOff x="0" y="0"/>
+          <a:chExt cx="0" cy="0"/>
+        </a:xfrm>
+      </p:grpSpPr>
+      <p:sp>
+        <p:nvSpPr>
+          <p:cNvPr id="122" name="TextShape 1"/>
+          <p:cNvSpPr txBox="1"/>
+          <p:nvPr/>
+        </p:nvSpPr>
+        <p:spPr>
+          <a:xfrm>
+            <a:off x="720000" y="300960"/>
+            <a:ext cx="8855640" cy="1262520"/>
+          </a:xfrm>
+          <a:prstGeom prst="rect">
+            <a:avLst/>
+          </a:prstGeom>
+          <a:noFill/>
+          <a:ln>
+            <a:noFill/>
+          </a:ln>
+        </p:spPr>
+        <p:txBody>
+          <a:bodyPr lIns="0" rIns="0" tIns="0" bIns="0" anchor="ctr"/>
+          <a:p>
+            <a:r>
+              <a:rPr b="1" lang="en-CA" sz="4400" spc="-1" strike="noStrike">
+                <a:solidFill>
+                  <a:srgbClr val="333333"/>
+                </a:solidFill>
+                <a:latin typeface="Noto Sans Regular"/>
+              </a:rPr>
+              <a:t>Anatony of a ROS Project</a:t>
+            </a:r>
+            <a:endParaRPr b="1" lang="en-CA" sz="4400" spc="-1" strike="noStrike">
+              <a:solidFill>
+                <a:srgbClr val="333333"/>
+              </a:solidFill>
+              <a:latin typeface="Noto Sans Regular"/>
+            </a:endParaRPr>
+          </a:p>
+        </p:txBody>
+      </p:sp>
       <p:pic>
         <p:nvPicPr>
-          <p:cNvPr id="122" name="" descr=""/>
+          <p:cNvPr id="123" name="" descr=""/>
+          <p:cNvPicPr/>
+          <p:nvPr/>
+        </p:nvPicPr>
+        <p:blipFill>
+          <a:blip r:embed="rId1"/>
+          <a:stretch/>
+        </p:blipFill>
+        <p:spPr>
+          <a:xfrm>
+            <a:off x="617760" y="1833840"/>
+            <a:ext cx="2838240" cy="1190160"/>
+          </a:xfrm>
+          <a:prstGeom prst="rect">
+            <a:avLst/>
+          </a:prstGeom>
+          <a:ln>
+            <a:noFill/>
+          </a:ln>
+        </p:spPr>
+      </p:pic>
+      <p:pic>
+        <p:nvPicPr>
+          <p:cNvPr id="124" name="" descr=""/>
           <p:cNvPicPr/>
           <p:nvPr/>
         </p:nvPicPr>
@@ -4138,7 +4288,7 @@
       </p:pic>
       <p:sp>
         <p:nvSpPr>
-          <p:cNvPr id="123" name="CustomShape 2"/>
+          <p:cNvPr id="125" name="CustomShape 2"/>
           <p:cNvSpPr/>
           <p:nvPr/>
         </p:nvSpPr>
@@ -4199,7 +4349,7 @@
       </p:sp>
       <p:sp>
         <p:nvSpPr>
-          <p:cNvPr id="124" name="TextShape 3"/>
+          <p:cNvPr id="126" name="TextShape 3"/>
           <p:cNvSpPr txBox="1"/>
           <p:nvPr/>
         </p:nvSpPr>
@@ -4233,7 +4383,7 @@
       </p:sp>
       <p:sp>
         <p:nvSpPr>
-          <p:cNvPr id="125" name="TextShape 4"/>
+          <p:cNvPr id="127" name="TextShape 4"/>
           <p:cNvSpPr txBox="1"/>
           <p:nvPr/>
         </p:nvSpPr>
@@ -4267,7 +4417,7 @@
       </p:sp>
       <p:graphicFrame>
         <p:nvGraphicFramePr>
-          <p:cNvPr id="126" name="Table 5"/>
+          <p:cNvPr id="128" name="Table 5"/>
           <p:cNvGraphicFramePr/>
           <p:nvPr/>
         </p:nvGraphicFramePr>
@@ -4793,7 +4943,7 @@
       </p:graphicFrame>
       <p:sp>
         <p:nvSpPr>
-          <p:cNvPr id="127" name="TextShape 6"/>
+          <p:cNvPr id="129" name="TextShape 6"/>
           <p:cNvSpPr txBox="1"/>
           <p:nvPr/>
         </p:nvSpPr>
@@ -4895,298 +5045,6 @@
             </a:endParaRPr>
           </a:p>
         </p:txBody>
-      </p:sp>
-    </p:spTree>
-  </p:cSld>
-</p:sld>
-</file>
-
-<file path=ppt/slides/slide12.xml><?xml version="1.0" encoding="utf-8"?>
-<p:sld xmlns:a="http://schemas.openxmlformats.org/drawingml/2006/main" xmlns:p="http://schemas.openxmlformats.org/presentationml/2006/main" xmlns:r="http://schemas.openxmlformats.org/officeDocument/2006/relationships" xmlns:p14="http://schemas.microsoft.com/office/powerpoint/2010/main" xmlns:p15="http://schemas.microsoft.com/office/powerpoint/2012/main" xmlns:mc="http://schemas.openxmlformats.org/markup-compatibility/2006">
-  <p:cSld>
-    <p:spTree>
-      <p:nvGrpSpPr>
-        <p:cNvPr id="1" name=""/>
-        <p:cNvGrpSpPr/>
-        <p:nvPr/>
-      </p:nvGrpSpPr>
-      <p:grpSpPr>
-        <a:xfrm>
-          <a:off x="0" y="0"/>
-          <a:ext cx="0" cy="0"/>
-          <a:chOff x="0" y="0"/>
-          <a:chExt cx="0" cy="0"/>
-        </a:xfrm>
-      </p:grpSpPr>
-      <p:sp>
-        <p:nvSpPr>
-          <p:cNvPr id="128" name="TextShape 1"/>
-          <p:cNvSpPr txBox="1"/>
-          <p:nvPr/>
-        </p:nvSpPr>
-        <p:spPr>
-          <a:xfrm>
-            <a:off x="720000" y="279720"/>
-            <a:ext cx="8855640" cy="1305000"/>
-          </a:xfrm>
-          <a:prstGeom prst="rect">
-            <a:avLst/>
-          </a:prstGeom>
-          <a:noFill/>
-          <a:ln>
-            <a:noFill/>
-          </a:ln>
-        </p:spPr>
-        <p:txBody>
-          <a:bodyPr lIns="0" rIns="0" tIns="0" bIns="0" anchor="ctr"/>
-          <a:p>
-            <a:r>
-              <a:rPr b="1" lang="en-CA" sz="4400" spc="-1" strike="noStrike">
-                <a:solidFill>
-                  <a:srgbClr val="333333"/>
-                </a:solidFill>
-                <a:latin typeface="Noto Sans Regular"/>
-              </a:rPr>
-              <a:t>Subscriber / Publisher Example</a:t>
-            </a:r>
-            <a:endParaRPr b="1" lang="en-CA" sz="4400" spc="-1" strike="noStrike">
-              <a:solidFill>
-                <a:srgbClr val="333333"/>
-              </a:solidFill>
-              <a:latin typeface="Noto Sans Regular"/>
-            </a:endParaRPr>
-          </a:p>
-        </p:txBody>
-      </p:sp>
-      <p:pic>
-        <p:nvPicPr>
-          <p:cNvPr id="129" name="" descr=""/>
-          <p:cNvPicPr/>
-          <p:nvPr/>
-        </p:nvPicPr>
-        <p:blipFill>
-          <a:blip r:embed="rId1"/>
-          <a:stretch/>
-        </p:blipFill>
-        <p:spPr>
-          <a:xfrm>
-            <a:off x="576000" y="2376000"/>
-            <a:ext cx="4152600" cy="3524040"/>
-          </a:xfrm>
-          <a:prstGeom prst="rect">
-            <a:avLst/>
-          </a:prstGeom>
-          <a:ln>
-            <a:noFill/>
-          </a:ln>
-        </p:spPr>
-      </p:pic>
-      <p:pic>
-        <p:nvPicPr>
-          <p:cNvPr id="130" name="" descr=""/>
-          <p:cNvPicPr/>
-          <p:nvPr/>
-        </p:nvPicPr>
-        <p:blipFill>
-          <a:blip r:embed="rId2"/>
-          <a:stretch/>
-        </p:blipFill>
-        <p:spPr>
-          <a:xfrm>
-            <a:off x="5112000" y="2335680"/>
-            <a:ext cx="4524120" cy="3352320"/>
-          </a:xfrm>
-          <a:prstGeom prst="rect">
-            <a:avLst/>
-          </a:prstGeom>
-          <a:ln>
-            <a:noFill/>
-          </a:ln>
-        </p:spPr>
-      </p:pic>
-      <p:sp>
-        <p:nvSpPr>
-          <p:cNvPr id="131" name="TextShape 2"/>
-          <p:cNvSpPr txBox="1"/>
-          <p:nvPr/>
-        </p:nvSpPr>
-        <p:spPr>
-          <a:xfrm>
-            <a:off x="1656000" y="1944000"/>
-            <a:ext cx="1776240" cy="346680"/>
-          </a:xfrm>
-          <a:prstGeom prst="rect">
-            <a:avLst/>
-          </a:prstGeom>
-          <a:noFill/>
-          <a:ln>
-            <a:noFill/>
-          </a:ln>
-        </p:spPr>
-        <p:txBody>
-          <a:bodyPr lIns="90000" rIns="90000" tIns="45000" bIns="45000"/>
-          <a:p>
-            <a:r>
-              <a:rPr b="0" lang="en-CA" sz="1800" spc="-1" strike="noStrike">
-                <a:latin typeface="Arial"/>
-              </a:rPr>
-              <a:t>Publisher Node</a:t>
-            </a:r>
-            <a:endParaRPr b="0" lang="en-CA" sz="1800" spc="-1" strike="noStrike">
-              <a:latin typeface="Arial"/>
-            </a:endParaRPr>
-          </a:p>
-        </p:txBody>
-      </p:sp>
-      <p:sp>
-        <p:nvSpPr>
-          <p:cNvPr id="132" name="TextShape 3"/>
-          <p:cNvSpPr txBox="1"/>
-          <p:nvPr/>
-        </p:nvSpPr>
-        <p:spPr>
-          <a:xfrm>
-            <a:off x="6624000" y="1885320"/>
-            <a:ext cx="2088000" cy="602280"/>
-          </a:xfrm>
-          <a:prstGeom prst="rect">
-            <a:avLst/>
-          </a:prstGeom>
-          <a:noFill/>
-          <a:ln>
-            <a:noFill/>
-          </a:ln>
-        </p:spPr>
-        <p:txBody>
-          <a:bodyPr lIns="90000" rIns="90000" tIns="45000" bIns="45000"/>
-          <a:p>
-            <a:r>
-              <a:rPr b="0" lang="en-CA" sz="1800" spc="-1" strike="noStrike">
-                <a:latin typeface="Arial"/>
-              </a:rPr>
-              <a:t>Subscriber Node</a:t>
-            </a:r>
-            <a:endParaRPr b="0" lang="en-CA" sz="1800" spc="-1" strike="noStrike">
-              <a:latin typeface="Arial"/>
-            </a:endParaRPr>
-          </a:p>
-        </p:txBody>
-      </p:sp>
-      <p:sp>
-        <p:nvSpPr>
-          <p:cNvPr id="133" name="CustomShape 4"/>
-          <p:cNvSpPr/>
-          <p:nvPr/>
-        </p:nvSpPr>
-        <p:spPr>
-          <a:xfrm>
-            <a:off x="792000" y="3960000"/>
-            <a:ext cx="3816000" cy="288000"/>
-          </a:xfrm>
-          <a:prstGeom prst="rect">
-            <a:avLst/>
-          </a:prstGeom>
-          <a:noFill/>
-          <a:ln w="29160">
-            <a:solidFill>
-              <a:srgbClr val="fff200"/>
-            </a:solidFill>
-            <a:round/>
-          </a:ln>
-        </p:spPr>
-        <p:style>
-          <a:lnRef idx="0"/>
-          <a:fillRef idx="0"/>
-          <a:effectRef idx="0"/>
-          <a:fontRef idx="minor"/>
-        </p:style>
-      </p:sp>
-      <p:sp>
-        <p:nvSpPr>
-          <p:cNvPr id="134" name="CustomShape 5"/>
-          <p:cNvSpPr/>
-          <p:nvPr/>
-        </p:nvSpPr>
-        <p:spPr>
-          <a:xfrm>
-            <a:off x="1008000" y="5364000"/>
-            <a:ext cx="1656000" cy="288000"/>
-          </a:xfrm>
-          <a:prstGeom prst="rect">
-            <a:avLst/>
-          </a:prstGeom>
-          <a:noFill/>
-          <a:ln w="29160">
-            <a:solidFill>
-              <a:srgbClr val="fff200"/>
-            </a:solidFill>
-            <a:round/>
-          </a:ln>
-        </p:spPr>
-        <p:style>
-          <a:lnRef idx="0"/>
-          <a:fillRef idx="0"/>
-          <a:effectRef idx="0"/>
-          <a:fontRef idx="minor"/>
-        </p:style>
-      </p:sp>
-      <p:sp>
-        <p:nvSpPr>
-          <p:cNvPr id="135" name="CustomShape 6"/>
-          <p:cNvSpPr/>
-          <p:nvPr/>
-        </p:nvSpPr>
-        <p:spPr>
-          <a:xfrm>
-            <a:off x="5328000" y="4752000"/>
-            <a:ext cx="4032000" cy="288000"/>
-          </a:xfrm>
-          <a:prstGeom prst="rect">
-            <a:avLst/>
-          </a:prstGeom>
-          <a:noFill/>
-          <a:ln w="29160">
-            <a:solidFill>
-              <a:srgbClr val="fff200"/>
-            </a:solidFill>
-            <a:round/>
-          </a:ln>
-        </p:spPr>
-        <p:style>
-          <a:lnRef idx="0"/>
-          <a:fillRef idx="0"/>
-          <a:effectRef idx="0"/>
-          <a:fontRef idx="minor"/>
-        </p:style>
-      </p:sp>
-      <p:sp>
-        <p:nvSpPr>
-          <p:cNvPr id="136" name="CustomShape 7"/>
-          <p:cNvSpPr/>
-          <p:nvPr/>
-        </p:nvSpPr>
-        <p:spPr>
-          <a:xfrm>
-            <a:off x="5112000" y="3096000"/>
-            <a:ext cx="1656000" cy="288000"/>
-          </a:xfrm>
-          <a:prstGeom prst="rect">
-            <a:avLst/>
-          </a:prstGeom>
-          <a:noFill/>
-          <a:ln w="29160">
-            <a:solidFill>
-              <a:srgbClr val="fff200"/>
-            </a:solidFill>
-            <a:round/>
-          </a:ln>
-        </p:spPr>
-        <p:style>
-          <a:lnRef idx="0"/>
-          <a:fillRef idx="0"/>
-          <a:effectRef idx="0"/>
-          <a:fontRef idx="minor"/>
-        </p:style>
       </p:sp>
     </p:spTree>
   </p:cSld>
@@ -5212,14 +5070,14 @@
       </p:grpSpPr>
       <p:sp>
         <p:nvSpPr>
-          <p:cNvPr id="137" name="TextShape 1"/>
+          <p:cNvPr id="130" name="TextShape 1"/>
           <p:cNvSpPr txBox="1"/>
           <p:nvPr/>
         </p:nvSpPr>
         <p:spPr>
           <a:xfrm>
-            <a:off x="720000" y="300960"/>
-            <a:ext cx="8855640" cy="1262520"/>
+            <a:off x="720000" y="279720"/>
+            <a:ext cx="8855640" cy="1305000"/>
           </a:xfrm>
           <a:prstGeom prst="rect">
             <a:avLst/>
@@ -5239,7 +5097,7 @@
                 </a:solidFill>
                 <a:latin typeface="Noto Sans Regular"/>
               </a:rPr>
-              <a:t>Rosrun</a:t>
+              <a:t>Subscriber / Publisher Example</a:t>
             </a:r>
             <a:endParaRPr b="1" lang="en-CA" sz="4400" spc="-1" strike="noStrike">
               <a:solidFill>
@@ -5250,16 +5108,62 @@
           </a:p>
         </p:txBody>
       </p:sp>
-      <p:sp>
-        <p:nvSpPr>
-          <p:cNvPr id="138" name="TextShape 2"/>
+      <p:pic>
+        <p:nvPicPr>
+          <p:cNvPr id="131" name="" descr=""/>
+          <p:cNvPicPr/>
+          <p:nvPr/>
+        </p:nvPicPr>
+        <p:blipFill>
+          <a:blip r:embed="rId1"/>
+          <a:stretch/>
+        </p:blipFill>
+        <p:spPr>
+          <a:xfrm>
+            <a:off x="576000" y="2376000"/>
+            <a:ext cx="4152600" cy="3524040"/>
+          </a:xfrm>
+          <a:prstGeom prst="rect">
+            <a:avLst/>
+          </a:prstGeom>
+          <a:ln>
+            <a:noFill/>
+          </a:ln>
+        </p:spPr>
+      </p:pic>
+      <p:pic>
+        <p:nvPicPr>
+          <p:cNvPr id="132" name="" descr=""/>
+          <p:cNvPicPr/>
+          <p:nvPr/>
+        </p:nvPicPr>
+        <p:blipFill>
+          <a:blip r:embed="rId2"/>
+          <a:stretch/>
+        </p:blipFill>
+        <p:spPr>
+          <a:xfrm>
+            <a:off x="5112000" y="2335680"/>
+            <a:ext cx="4524120" cy="3352320"/>
+          </a:xfrm>
+          <a:prstGeom prst="rect">
+            <a:avLst/>
+          </a:prstGeom>
+          <a:ln>
+            <a:noFill/>
+          </a:ln>
+        </p:spPr>
+      </p:pic>
+      <p:sp>
+        <p:nvSpPr>
+          <p:cNvPr id="133" name="TextShape 2"/>
           <p:cNvSpPr txBox="1"/>
           <p:nvPr/>
         </p:nvSpPr>
         <p:spPr>
           <a:xfrm>
-            <a:off x="648000" y="1591200"/>
-            <a:ext cx="8640000" cy="2872800"/>
+            <a:off x="1656000" y="1944000"/>
+            <a:ext cx="1776240" cy="346680"/>
           </a:xfrm>
           <a:prstGeom prst="rect">
             <a:avLst/>
@@ -5270,271 +5174,169 @@
           </a:ln>
         </p:spPr>
         <p:txBody>
-          <a:bodyPr lIns="0" rIns="0" tIns="0" bIns="0"/>
-          <a:p>
-            <a:pPr marL="432000" indent="-324000">
-              <a:spcAft>
-                <a:spcPts val="1414"/>
-              </a:spcAft>
-              <a:buClr>
-                <a:srgbClr val="ef2929"/>
-              </a:buClr>
-              <a:buSzPct val="45000"/>
-              <a:buFont typeface="Wingdings" charset="2"/>
-              <a:buChar char=""/>
-            </a:pPr>
-            <a:r>
-              <a:rPr b="0" lang="en-CA" sz="2800" spc="-1" strike="noStrike">
-                <a:solidFill>
-                  <a:srgbClr val="333333"/>
-                </a:solidFill>
-                <a:latin typeface="Noto Sans Regular"/>
-              </a:rPr>
-              <a:t>Used to run individual nodes</a:t>
-            </a:r>
-            <a:endParaRPr b="0" lang="en-CA" sz="2800" spc="-1" strike="noStrike">
-              <a:solidFill>
-                <a:srgbClr val="333333"/>
-              </a:solidFill>
-              <a:latin typeface="Noto Sans Regular"/>
-            </a:endParaRPr>
-          </a:p>
-          <a:p>
-            <a:pPr marL="432000" indent="-324000">
-              <a:spcAft>
-                <a:spcPts val="1414"/>
-              </a:spcAft>
-              <a:buClr>
-                <a:srgbClr val="ef2929"/>
-              </a:buClr>
-              <a:buSzPct val="45000"/>
-              <a:buFont typeface="Wingdings" charset="2"/>
-              <a:buChar char=""/>
-            </a:pPr>
-            <a:r>
-              <a:rPr b="1" lang="en-CA" sz="2800" spc="-1" strike="noStrike">
-                <a:solidFill>
-                  <a:srgbClr val="333333"/>
-                </a:solidFill>
-                <a:latin typeface="Courier New"/>
-              </a:rPr>
-              <a:t>rosrun </a:t>
-            </a:r>
-            <a:r>
-              <a:rPr b="0" lang="en-CA" sz="2800" spc="-1" strike="noStrike">
-                <a:solidFill>
-                  <a:srgbClr val="333333"/>
-                </a:solidFill>
-                <a:latin typeface="Courier New"/>
-              </a:rPr>
-              <a:t>&lt;package&gt; &lt;node&gt;</a:t>
-            </a:r>
-            <a:endParaRPr b="0" lang="en-CA" sz="2800" spc="-1" strike="noStrike">
-              <a:solidFill>
-                <a:srgbClr val="333333"/>
-              </a:solidFill>
-              <a:latin typeface="Noto Sans Regular"/>
-            </a:endParaRPr>
-          </a:p>
-          <a:p>
-            <a:pPr marL="432000" indent="-324000">
-              <a:spcAft>
-                <a:spcPts val="1414"/>
-              </a:spcAft>
-              <a:buClr>
-                <a:srgbClr val="ef2929"/>
-              </a:buClr>
-              <a:buSzPct val="45000"/>
-              <a:buFont typeface="Wingdings" charset="2"/>
-              <a:buChar char=""/>
-            </a:pPr>
-            <a:endParaRPr b="0" lang="en-CA" sz="2800" spc="-1" strike="noStrike">
-              <a:solidFill>
-                <a:srgbClr val="333333"/>
-              </a:solidFill>
-              <a:latin typeface="Noto Sans Regular"/>
-            </a:endParaRPr>
-          </a:p>
-          <a:p>
-            <a:pPr marL="432000" indent="-324000">
-              <a:spcAft>
-                <a:spcPts val="1414"/>
-              </a:spcAft>
-              <a:buClr>
-                <a:srgbClr val="ef2929"/>
-              </a:buClr>
-              <a:buSzPct val="45000"/>
-              <a:buFont typeface="Wingdings" charset="2"/>
-              <a:buChar char=""/>
-            </a:pPr>
-            <a:r>
-              <a:rPr b="1" lang="en-CA" sz="2800" spc="-1" strike="noStrike">
-                <a:solidFill>
-                  <a:srgbClr val="333333"/>
-                </a:solidFill>
-                <a:latin typeface="Noto Sans Regular"/>
-              </a:rPr>
-              <a:t>Example:</a:t>
-            </a:r>
-            <a:r>
-              <a:rPr b="0" lang="en-CA" sz="2800" spc="-1" strike="noStrike">
-                <a:solidFill>
-                  <a:srgbClr val="333333"/>
-                </a:solidFill>
-                <a:latin typeface="Noto Sans Regular"/>
-              </a:rPr>
-              <a:t> run 1) master node, 2) publisher node, 3) subscriber node</a:t>
-            </a:r>
-            <a:endParaRPr b="0" lang="en-CA" sz="2800" spc="-1" strike="noStrike">
-              <a:solidFill>
-                <a:srgbClr val="333333"/>
-              </a:solidFill>
-              <a:latin typeface="Noto Sans Regular"/>
-            </a:endParaRPr>
-          </a:p>
-          <a:p>
-            <a:pPr marL="432000" indent="-324000">
-              <a:spcAft>
-                <a:spcPts val="1414"/>
-              </a:spcAft>
-              <a:buClr>
-                <a:srgbClr val="ef2929"/>
-              </a:buClr>
-              <a:buSzPct val="45000"/>
-              <a:buFont typeface="Wingdings" charset="2"/>
-              <a:buChar char=""/>
-            </a:pPr>
-            <a:br/>
-            <a:r>
-              <a:rPr b="0" lang="en-CA" sz="2800" spc="-1" strike="noStrike">
-                <a:solidFill>
-                  <a:srgbClr val="333333"/>
-                </a:solidFill>
-                <a:latin typeface="Courier New"/>
-              </a:rPr>
-              <a:t>roscore</a:t>
-            </a:r>
-            <a:endParaRPr b="0" lang="en-CA" sz="2800" spc="-1" strike="noStrike">
-              <a:solidFill>
-                <a:srgbClr val="333333"/>
-              </a:solidFill>
-              <a:latin typeface="Noto Sans Regular"/>
-            </a:endParaRPr>
-          </a:p>
-          <a:p>
-            <a:pPr marL="432000" indent="-324000">
-              <a:spcAft>
-                <a:spcPts val="1414"/>
-              </a:spcAft>
-              <a:buClr>
-                <a:srgbClr val="ef2929"/>
-              </a:buClr>
-              <a:buSzPct val="45000"/>
-              <a:buFont typeface="Wingdings" charset="2"/>
-              <a:buChar char=""/>
-            </a:pPr>
-            <a:r>
-              <a:rPr b="0" lang="en-CA" sz="2800" spc="-1" strike="noStrike">
-                <a:solidFill>
-                  <a:srgbClr val="333333"/>
-                </a:solidFill>
-                <a:latin typeface="Courier New"/>
-              </a:rPr>
-              <a:t>rosrun ros_tutorial publisher.py </a:t>
-            </a:r>
-            <a:endParaRPr b="0" lang="en-CA" sz="2800" spc="-1" strike="noStrike">
-              <a:solidFill>
-                <a:srgbClr val="333333"/>
-              </a:solidFill>
-              <a:latin typeface="Noto Sans Regular"/>
-            </a:endParaRPr>
-          </a:p>
-          <a:p>
-            <a:pPr marL="432000" indent="-324000">
-              <a:spcAft>
-                <a:spcPts val="1414"/>
-              </a:spcAft>
-              <a:buClr>
-                <a:srgbClr val="ef2929"/>
-              </a:buClr>
-              <a:buSzPct val="45000"/>
-              <a:buFont typeface="Wingdings" charset="2"/>
-              <a:buChar char=""/>
-            </a:pPr>
-            <a:r>
-              <a:rPr b="0" lang="en-CA" sz="2800" spc="-1" strike="noStrike">
-                <a:solidFill>
-                  <a:srgbClr val="333333"/>
-                </a:solidFill>
-                <a:latin typeface="Courier New"/>
-              </a:rPr>
-              <a:t>rosrun ros_tutorial subscriber.py</a:t>
-            </a:r>
-            <a:endParaRPr b="0" lang="en-CA" sz="2800" spc="-1" strike="noStrike">
-              <a:solidFill>
-                <a:srgbClr val="333333"/>
-              </a:solidFill>
-              <a:latin typeface="Noto Sans Regular"/>
-            </a:endParaRPr>
-          </a:p>
-          <a:p>
-            <a:pPr marL="432000" indent="-324000">
-              <a:spcAft>
-                <a:spcPts val="1414"/>
-              </a:spcAft>
-              <a:buClr>
-                <a:srgbClr val="ef2929"/>
-              </a:buClr>
-              <a:buSzPct val="45000"/>
-              <a:buFont typeface="Wingdings" charset="2"/>
-              <a:buChar char=""/>
-            </a:pPr>
-            <a:endParaRPr b="0" lang="en-CA" sz="2800" spc="-1" strike="noStrike">
-              <a:solidFill>
-                <a:srgbClr val="333333"/>
-              </a:solidFill>
-              <a:latin typeface="Noto Sans Regular"/>
-            </a:endParaRPr>
-          </a:p>
-          <a:p>
-            <a:pPr marL="432000" indent="-324000">
-              <a:spcAft>
-                <a:spcPts val="1414"/>
-              </a:spcAft>
-              <a:buClr>
-                <a:srgbClr val="ef2929"/>
-              </a:buClr>
-              <a:buSzPct val="45000"/>
-              <a:buFont typeface="Wingdings" charset="2"/>
-              <a:buChar char=""/>
-            </a:pPr>
-            <a:endParaRPr b="0" lang="en-CA" sz="2800" spc="-1" strike="noStrike">
-              <a:solidFill>
-                <a:srgbClr val="333333"/>
-              </a:solidFill>
-              <a:latin typeface="Noto Sans Regular"/>
-            </a:endParaRPr>
-          </a:p>
-          <a:p>
-            <a:pPr marL="432000" indent="-324000">
-              <a:spcAft>
-                <a:spcPts val="1414"/>
-              </a:spcAft>
-              <a:buClr>
-                <a:srgbClr val="ef2929"/>
-              </a:buClr>
-              <a:buSzPct val="45000"/>
-              <a:buFont typeface="Wingdings" charset="2"/>
-              <a:buChar char=""/>
-            </a:pPr>
-            <a:endParaRPr b="0" lang="en-CA" sz="2800" spc="-1" strike="noStrike">
-              <a:solidFill>
-                <a:srgbClr val="333333"/>
-              </a:solidFill>
-              <a:latin typeface="Noto Sans Regular"/>
-            </a:endParaRPr>
-          </a:p>
-        </p:txBody>
+          <a:bodyPr lIns="90000" rIns="90000" tIns="45000" bIns="45000"/>
+          <a:p>
+            <a:r>
+              <a:rPr b="0" lang="en-CA" sz="1800" spc="-1" strike="noStrike">
+                <a:latin typeface="Arial"/>
+              </a:rPr>
+              <a:t>Publisher Node</a:t>
+            </a:r>
+            <a:endParaRPr b="0" lang="en-CA" sz="1800" spc="-1" strike="noStrike">
+              <a:latin typeface="Arial"/>
+            </a:endParaRPr>
+          </a:p>
+        </p:txBody>
+      </p:sp>
+      <p:sp>
+        <p:nvSpPr>
+          <p:cNvPr id="134" name="TextShape 3"/>
+          <p:cNvSpPr txBox="1"/>
+          <p:nvPr/>
+        </p:nvSpPr>
+        <p:spPr>
+          <a:xfrm>
+            <a:off x="6624000" y="1885320"/>
+            <a:ext cx="2088000" cy="602280"/>
+          </a:xfrm>
+          <a:prstGeom prst="rect">
+            <a:avLst/>
+          </a:prstGeom>
+          <a:noFill/>
+          <a:ln>
+            <a:noFill/>
+          </a:ln>
+        </p:spPr>
+        <p:txBody>
+          <a:bodyPr lIns="90000" rIns="90000" tIns="45000" bIns="45000"/>
+          <a:p>
+            <a:r>
+              <a:rPr b="0" lang="en-CA" sz="1800" spc="-1" strike="noStrike">
+                <a:latin typeface="Arial"/>
+              </a:rPr>
+              <a:t>Subscriber Node</a:t>
+            </a:r>
+            <a:endParaRPr b="0" lang="en-CA" sz="1800" spc="-1" strike="noStrike">
+              <a:latin typeface="Arial"/>
+            </a:endParaRPr>
+          </a:p>
+        </p:txBody>
+      </p:sp>
+      <p:sp>
+        <p:nvSpPr>
+          <p:cNvPr id="135" name="CustomShape 4"/>
+          <p:cNvSpPr/>
+          <p:nvPr/>
+        </p:nvSpPr>
+        <p:spPr>
+          <a:xfrm>
+            <a:off x="792000" y="3960000"/>
+            <a:ext cx="3816000" cy="288000"/>
+          </a:xfrm>
+          <a:prstGeom prst="rect">
+            <a:avLst/>
+          </a:prstGeom>
+          <a:noFill/>
+          <a:ln w="29160">
+            <a:solidFill>
+              <a:srgbClr val="fff200"/>
+            </a:solidFill>
+            <a:round/>
+          </a:ln>
+        </p:spPr>
+        <p:style>
+          <a:lnRef idx="0"/>
+          <a:fillRef idx="0"/>
+          <a:effectRef idx="0"/>
+          <a:fontRef idx="minor"/>
+        </p:style>
+      </p:sp>
+      <p:sp>
+        <p:nvSpPr>
+          <p:cNvPr id="136" name="CustomShape 5"/>
+          <p:cNvSpPr/>
+          <p:nvPr/>
+        </p:nvSpPr>
+        <p:spPr>
+          <a:xfrm>
+            <a:off x="1008000" y="5364000"/>
+            <a:ext cx="1656000" cy="288000"/>
+          </a:xfrm>
+          <a:prstGeom prst="rect">
+            <a:avLst/>
+          </a:prstGeom>
+          <a:noFill/>
+          <a:ln w="29160">
+            <a:solidFill>
+              <a:srgbClr val="fff200"/>
+            </a:solidFill>
+            <a:round/>
+          </a:ln>
+        </p:spPr>
+        <p:style>
+          <a:lnRef idx="0"/>
+          <a:fillRef idx="0"/>
+          <a:effectRef idx="0"/>
+          <a:fontRef idx="minor"/>
+        </p:style>
+      </p:sp>
+      <p:sp>
+        <p:nvSpPr>
+          <p:cNvPr id="137" name="CustomShape 6"/>
+          <p:cNvSpPr/>
+          <p:nvPr/>
+        </p:nvSpPr>
+        <p:spPr>
+          <a:xfrm>
+            <a:off x="5328000" y="4752000"/>
+            <a:ext cx="4032000" cy="288000"/>
+          </a:xfrm>
+          <a:prstGeom prst="rect">
+            <a:avLst/>
+          </a:prstGeom>
+          <a:noFill/>
+          <a:ln w="29160">
+            <a:solidFill>
+              <a:srgbClr val="fff200"/>
+            </a:solidFill>
+            <a:round/>
+          </a:ln>
+        </p:spPr>
+        <p:style>
+          <a:lnRef idx="0"/>
+          <a:fillRef idx="0"/>
+          <a:effectRef idx="0"/>
+          <a:fontRef idx="minor"/>
+        </p:style>
+      </p:sp>
+      <p:sp>
+        <p:nvSpPr>
+          <p:cNvPr id="138" name="CustomShape 7"/>
+          <p:cNvSpPr/>
+          <p:nvPr/>
+        </p:nvSpPr>
+        <p:spPr>
+          <a:xfrm>
+            <a:off x="5112000" y="3096000"/>
+            <a:ext cx="1656000" cy="288000"/>
+          </a:xfrm>
+          <a:prstGeom prst="rect">
+            <a:avLst/>
+          </a:prstGeom>
+          <a:noFill/>
+          <a:ln w="29160">
+            <a:solidFill>
+              <a:srgbClr val="fff200"/>
+            </a:solidFill>
+            <a:round/>
+          </a:ln>
+        </p:spPr>
+        <p:style>
+          <a:lnRef idx="0"/>
+          <a:fillRef idx="0"/>
+          <a:effectRef idx="0"/>
+          <a:fontRef idx="minor"/>
+        </p:style>
       </p:sp>
     </p:spTree>
   </p:cSld>
@@ -5587,7 +5389,7 @@
                 </a:solidFill>
                 <a:latin typeface="Noto Sans Regular"/>
               </a:rPr>
-              <a:t>Roslaunch</a:t>
+              <a:t>Rosrun</a:t>
             </a:r>
             <a:endParaRPr b="1" lang="en-CA" sz="4400" spc="-1" strike="noStrike">
               <a:solidFill>
@@ -5606,8 +5408,8 @@
         </p:nvSpPr>
         <p:spPr>
           <a:xfrm>
-            <a:off x="504000" y="1512000"/>
-            <a:ext cx="8640000" cy="4384800"/>
+            <a:off x="648000" y="1591200"/>
+            <a:ext cx="8640000" cy="2872800"/>
           </a:xfrm>
           <a:prstGeom prst="rect">
             <a:avLst/>
@@ -5632,25 +5434,15 @@
               <a:buChar char=""/>
             </a:pPr>
             <a:r>
-              <a:rPr b="0" lang="en-CA" sz="2600" spc="-1" strike="noStrike" u="sng">
-                <a:solidFill>
-                  <a:srgbClr val="333333"/>
-                </a:solidFill>
-                <a:uFillTx/>
+              <a:rPr b="0" lang="en-CA" sz="2800" spc="-1" strike="noStrike">
+                <a:solidFill>
+                  <a:srgbClr val="333333"/>
+                </a:solidFill>
                 <a:latin typeface="Noto Sans Regular"/>
               </a:rPr>
-              <a:t>Motivation:</a:t>
-            </a:r>
-            <a:r>
-              <a:rPr b="0" lang="en-CA" sz="2600" spc="-1" strike="noStrike">
-                <a:solidFill>
-                  <a:srgbClr val="333333"/>
-                </a:solidFill>
-                <a:latin typeface="Noto Sans Regular"/>
-              </a:rPr>
-              <a:t> </a:t>
-            </a:r>
-            <a:endParaRPr b="0" lang="en-CA" sz="2600" spc="-1" strike="noStrike">
+              <a:t>Used to run individual nodes</a:t>
+            </a:r>
+            <a:endParaRPr b="0" lang="en-CA" sz="2800" spc="-1" strike="noStrike">
               <a:solidFill>
                 <a:srgbClr val="333333"/>
               </a:solidFill>
@@ -5670,15 +5462,24 @@
               <a:buChar char=""/>
             </a:pPr>
             <a:r>
-              <a:rPr b="0" lang="en-CA" sz="2600" spc="-1" strike="noStrike">
-                <a:solidFill>
-                  <a:srgbClr val="333333"/>
-                </a:solidFill>
-                <a:latin typeface="Noto Sans Regular"/>
-              </a:rPr>
-              <a:t>Running nodes 1-by-1 cumbersome </a:t>
-            </a:r>
-            <a:endParaRPr b="0" lang="en-CA" sz="2600" spc="-1" strike="noStrike">
+              <a:rPr b="1" lang="en-CA" sz="2800" spc="-1" strike="noStrike">
+                <a:solidFill>
+                  <a:srgbClr val="333333"/>
+                </a:solidFill>
+                <a:latin typeface="Courier New"/>
+              </a:rPr>
+              <a:t>rosrun </a:t>
+            </a:r>
+            <a:r>
+              <a:rPr b="0" lang="en-CA" sz="2800" spc="-1" strike="noStrike">
+                <a:solidFill>
+                  <a:srgbClr val="333333"/>
+                </a:solidFill>
+                <a:latin typeface="Courier New"/>
+              </a:rPr>
+              <a:t>&lt;package&gt; &lt;node&gt;</a:t>
+            </a:r>
+            <a:endParaRPr b="0" lang="en-CA" sz="2800" spc="-1" strike="noStrike">
               <a:solidFill>
                 <a:srgbClr val="333333"/>
               </a:solidFill>
@@ -5697,34 +5498,7 @@
               <a:buFont typeface="Wingdings" charset="2"/>
               <a:buChar char=""/>
             </a:pPr>
-            <a:r>
-              <a:rPr b="0" lang="en-CA" sz="2600" spc="-1" strike="noStrike">
-                <a:solidFill>
-                  <a:srgbClr val="333333"/>
-                </a:solidFill>
-                <a:latin typeface="Noto Sans Regular"/>
-              </a:rPr>
-              <a:t>Can run many nodes in batch using </a:t>
-            </a:r>
-            <a:r>
-              <a:rPr b="1" lang="en-CA" sz="2600" spc="-1" strike="noStrike">
-                <a:solidFill>
-                  <a:srgbClr val="333333"/>
-                </a:solidFill>
-                <a:latin typeface="Noto Sans Regular"/>
-              </a:rPr>
-              <a:t>launch</a:t>
-            </a:r>
-            <a:r>
-              <a:rPr b="0" lang="en-CA" sz="2600" spc="-1" strike="noStrike">
-                <a:solidFill>
-                  <a:srgbClr val="333333"/>
-                </a:solidFill>
-                <a:latin typeface="Noto Sans Regular"/>
-              </a:rPr>
-              <a:t> files</a:t>
-            </a:r>
-            <a:endParaRPr b="0" lang="en-CA" sz="2600" spc="-1" strike="noStrike">
+            <a:endParaRPr b="0" lang="en-CA" sz="2800" spc="-1" strike="noStrike">
               <a:solidFill>
                 <a:srgbClr val="333333"/>
               </a:solidFill>
@@ -5744,33 +5518,24 @@
               <a:buChar char=""/>
             </a:pPr>
             <a:r>
-              <a:rPr b="0" lang="en-CA" sz="2600" spc="-1" strike="noStrike">
-                <a:solidFill>
-                  <a:srgbClr val="333333"/>
-                </a:solidFill>
-                <a:latin typeface="Courier New"/>
-              </a:rPr>
-              <a:t>roslaunch</a:t>
-            </a:r>
-            <a:r>
-              <a:rPr b="1" lang="en-CA" sz="2600" spc="-1" strike="noStrike">
-                <a:solidFill>
-                  <a:srgbClr val="333333"/>
-                </a:solidFill>
-                <a:latin typeface="Courier New"/>
-              </a:rPr>
-              <a:t> </a:t>
-            </a:r>
-            <a:r>
-              <a:rPr b="0" lang="en-CA" sz="2600" spc="-1" strike="noStrike">
-                <a:solidFill>
-                  <a:srgbClr val="333333"/>
-                </a:solidFill>
-                <a:latin typeface="Courier New"/>
-              </a:rPr>
-              <a:t>&lt;package&gt; &lt;file.launch&gt;</a:t>
-            </a:r>
-            <a:endParaRPr b="0" lang="en-CA" sz="2600" spc="-1" strike="noStrike">
+              <a:rPr b="1" lang="en-CA" sz="2800" spc="-1" strike="noStrike">
+                <a:solidFill>
+                  <a:srgbClr val="333333"/>
+                </a:solidFill>
+                <a:latin typeface="Noto Sans Regular"/>
+              </a:rPr>
+              <a:t>Example:</a:t>
+            </a:r>
+            <a:r>
+              <a:rPr b="0" lang="en-CA" sz="2800" spc="-1" strike="noStrike">
+                <a:solidFill>
+                  <a:srgbClr val="333333"/>
+                </a:solidFill>
+                <a:latin typeface="Noto Sans Regular"/>
+              </a:rPr>
+              <a:t> run 1) master node, 2) publisher node, 3) subscriber node</a:t>
+            </a:r>
+            <a:endParaRPr b="0" lang="en-CA" sz="2800" spc="-1" strike="noStrike">
               <a:solidFill>
                 <a:srgbClr val="333333"/>
               </a:solidFill>
@@ -5789,101 +5554,134 @@
               <a:buFont typeface="Wingdings" charset="2"/>
               <a:buChar char=""/>
             </a:pPr>
-            <a:r>
-              <a:rPr b="1" lang="en-CA" sz="2600" spc="-1" strike="noStrike">
+            <a:br/>
+            <a:r>
+              <a:rPr b="0" lang="en-CA" sz="2800" spc="-1" strike="noStrike">
                 <a:solidFill>
                   <a:srgbClr val="333333"/>
                 </a:solidFill>
                 <a:latin typeface="Courier New"/>
               </a:rPr>
-              <a:t>Ex: </a:t>
-            </a:r>
-            <a:r>
-              <a:rPr b="0" lang="en-CA" sz="2600" spc="-1" strike="noStrike">
+              <a:t>roscore</a:t>
+            </a:r>
+            <a:endParaRPr b="0" lang="en-CA" sz="2800" spc="-1" strike="noStrike">
+              <a:solidFill>
+                <a:srgbClr val="333333"/>
+              </a:solidFill>
+              <a:latin typeface="Noto Sans Regular"/>
+            </a:endParaRPr>
+          </a:p>
+          <a:p>
+            <a:pPr marL="432000" indent="-324000">
+              <a:spcAft>
+                <a:spcPts val="1414"/>
+              </a:spcAft>
+              <a:buClr>
+                <a:srgbClr val="ef2929"/>
+              </a:buClr>
+              <a:buSzPct val="45000"/>
+              <a:buFont typeface="Wingdings" charset="2"/>
+              <a:buChar char=""/>
+            </a:pPr>
+            <a:r>
+              <a:rPr b="0" lang="en-CA" sz="2800" spc="-1" strike="noStrike">
                 <a:solidFill>
                   <a:srgbClr val="333333"/>
                 </a:solidFill>
                 <a:latin typeface="Courier New"/>
               </a:rPr>
-              <a:t>roslaunch ros_tutorial</a:t>
-            </a:r>
-            <a:r>
-              <a:rPr b="0" lang="en-CA" sz="2600" spc="-1" strike="noStrike">
+              <a:t>rosrun ros_tutorial publisher.py </a:t>
+            </a:r>
+            <a:endParaRPr b="0" lang="en-CA" sz="2800" spc="-1" strike="noStrike">
+              <a:solidFill>
+                <a:srgbClr val="333333"/>
+              </a:solidFill>
+              <a:latin typeface="Noto Sans Regular"/>
+            </a:endParaRPr>
+          </a:p>
+          <a:p>
+            <a:pPr marL="432000" indent="-324000">
+              <a:spcAft>
+                <a:spcPts val="1414"/>
+              </a:spcAft>
+              <a:buClr>
+                <a:srgbClr val="ef2929"/>
+              </a:buClr>
+              <a:buSzPct val="45000"/>
+              <a:buFont typeface="Wingdings" charset="2"/>
+              <a:buChar char=""/>
+            </a:pPr>
+            <a:r>
+              <a:rPr b="0" lang="en-CA" sz="2800" spc="-1" strike="noStrike">
                 <a:solidFill>
                   <a:srgbClr val="333333"/>
                 </a:solidFill>
                 <a:latin typeface="Courier New"/>
               </a:rPr>
-              <a:t> pub_sub.launch</a:t>
-            </a:r>
-            <a:endParaRPr b="0" lang="en-CA" sz="2600" spc="-1" strike="noStrike">
-              <a:solidFill>
-                <a:srgbClr val="333333"/>
-              </a:solidFill>
-              <a:latin typeface="Noto Sans Regular"/>
-            </a:endParaRPr>
-          </a:p>
-        </p:txBody>
-      </p:sp>
-      <p:pic>
-        <p:nvPicPr>
-          <p:cNvPr id="141" name="" descr=""/>
-          <p:cNvPicPr/>
-          <p:nvPr/>
-        </p:nvPicPr>
-        <p:blipFill>
-          <a:blip r:embed="rId1"/>
-          <a:stretch/>
-        </p:blipFill>
-        <p:spPr>
-          <a:xfrm>
-            <a:off x="576000" y="4680000"/>
-            <a:ext cx="9118080" cy="1800000"/>
-          </a:xfrm>
-          <a:prstGeom prst="rect">
-            <a:avLst/>
-          </a:prstGeom>
-          <a:ln>
-            <a:noFill/>
-          </a:ln>
-        </p:spPr>
-      </p:pic>
-      <p:sp>
-        <p:nvSpPr>
-          <p:cNvPr id="142" name="TextShape 3"/>
-          <p:cNvSpPr txBox="1"/>
-          <p:nvPr/>
-        </p:nvSpPr>
-        <p:spPr>
-          <a:xfrm>
-            <a:off x="720000" y="4329720"/>
-            <a:ext cx="4008240" cy="602280"/>
-          </a:xfrm>
-          <a:prstGeom prst="rect">
-            <a:avLst/>
-          </a:prstGeom>
-          <a:noFill/>
-          <a:ln>
-            <a:noFill/>
-          </a:ln>
-        </p:spPr>
-        <p:txBody>
-          <a:bodyPr lIns="90000" rIns="90000" tIns="45000" bIns="45000"/>
-          <a:p>
-            <a:r>
-              <a:rPr b="1" lang="en-CA" sz="1800" spc="-1" strike="noStrike">
-                <a:latin typeface="Arial"/>
-              </a:rPr>
-              <a:t>File path:</a:t>
-            </a:r>
-            <a:r>
-              <a:rPr b="0" lang="en-CA" sz="1800" spc="-1" strike="noStrike">
-                <a:latin typeface="Arial"/>
-              </a:rPr>
-              <a:t> /launch/pub_sub.launch</a:t>
-            </a:r>
-            <a:endParaRPr b="0" lang="en-CA" sz="1800" spc="-1" strike="noStrike">
-              <a:latin typeface="Arial"/>
+              <a:t>rosrun ros_tutorial subscriber.py</a:t>
+            </a:r>
+            <a:endParaRPr b="0" lang="en-CA" sz="2800" spc="-1" strike="noStrike">
+              <a:solidFill>
+                <a:srgbClr val="333333"/>
+              </a:solidFill>
+              <a:latin typeface="Noto Sans Regular"/>
+            </a:endParaRPr>
+          </a:p>
+          <a:p>
+            <a:pPr marL="432000" indent="-324000">
+              <a:spcAft>
+                <a:spcPts val="1414"/>
+              </a:spcAft>
+              <a:buClr>
+                <a:srgbClr val="ef2929"/>
+              </a:buClr>
+              <a:buSzPct val="45000"/>
+              <a:buFont typeface="Wingdings" charset="2"/>
+              <a:buChar char=""/>
+            </a:pPr>
+            <a:endParaRPr b="0" lang="en-CA" sz="2800" spc="-1" strike="noStrike">
+              <a:solidFill>
+                <a:srgbClr val="333333"/>
+              </a:solidFill>
+              <a:latin typeface="Noto Sans Regular"/>
+            </a:endParaRPr>
+          </a:p>
+          <a:p>
+            <a:pPr marL="432000" indent="-324000">
+              <a:spcAft>
+                <a:spcPts val="1414"/>
+              </a:spcAft>
+              <a:buClr>
+                <a:srgbClr val="ef2929"/>
+              </a:buClr>
+              <a:buSzPct val="45000"/>
+              <a:buFont typeface="Wingdings" charset="2"/>
+              <a:buChar char=""/>
+            </a:pPr>
+            <a:endParaRPr b="0" lang="en-CA" sz="2800" spc="-1" strike="noStrike">
+              <a:solidFill>
+                <a:srgbClr val="333333"/>
+              </a:solidFill>
+              <a:latin typeface="Noto Sans Regular"/>
+            </a:endParaRPr>
+          </a:p>
+          <a:p>
+            <a:pPr marL="432000" indent="-324000">
+              <a:spcAft>
+                <a:spcPts val="1414"/>
+              </a:spcAft>
+              <a:buClr>
+                <a:srgbClr val="ef2929"/>
+              </a:buClr>
+              <a:buSzPct val="45000"/>
+              <a:buFont typeface="Wingdings" charset="2"/>
+              <a:buChar char=""/>
+            </a:pPr>
+            <a:endParaRPr b="0" lang="en-CA" sz="2800" spc="-1" strike="noStrike">
+              <a:solidFill>
+                <a:srgbClr val="333333"/>
+              </a:solidFill>
+              <a:latin typeface="Noto Sans Regular"/>
             </a:endParaRPr>
           </a:p>
         </p:txBody>
@@ -5912,7 +5710,7 @@
       </p:grpSpPr>
       <p:sp>
         <p:nvSpPr>
-          <p:cNvPr id="143" name="TextShape 1"/>
+          <p:cNvPr id="141" name="TextShape 1"/>
           <p:cNvSpPr txBox="1"/>
           <p:nvPr/>
         </p:nvSpPr>
@@ -5939,7 +5737,7 @@
                 </a:solidFill>
                 <a:latin typeface="Noto Sans Regular"/>
               </a:rPr>
-              <a:t>Roslaunch with Parameters</a:t>
+              <a:t>Roslaunch</a:t>
             </a:r>
             <a:endParaRPr b="1" lang="en-CA" sz="4400" spc="-1" strike="noStrike">
               <a:solidFill>
@@ -5952,7 +5750,7 @@
       </p:sp>
       <p:sp>
         <p:nvSpPr>
-          <p:cNvPr id="144" name="TextShape 2"/>
+          <p:cNvPr id="142" name="TextShape 2"/>
           <p:cNvSpPr txBox="1"/>
           <p:nvPr/>
         </p:nvSpPr>
@@ -5984,13 +5782,23 @@
               <a:buChar char=""/>
             </a:pPr>
             <a:r>
+              <a:rPr b="0" lang="en-CA" sz="2600" spc="-1" strike="noStrike" u="sng">
+                <a:solidFill>
+                  <a:srgbClr val="333333"/>
+                </a:solidFill>
+                <a:uFillTx/>
+                <a:latin typeface="Noto Sans Regular"/>
+              </a:rPr>
+              <a:t>Motivation:</a:t>
+            </a:r>
+            <a:r>
               <a:rPr b="0" lang="en-CA" sz="2600" spc="-1" strike="noStrike">
                 <a:solidFill>
                   <a:srgbClr val="333333"/>
                 </a:solidFill>
                 <a:latin typeface="Noto Sans Regular"/>
               </a:rPr>
-              <a:t>Can run parameters to launch files</a:t>
+              <a:t> </a:t>
             </a:r>
             <a:endParaRPr b="0" lang="en-CA" sz="2600" spc="-1" strike="noStrike">
               <a:solidFill>
@@ -6011,6 +5819,15 @@
               <a:buFont typeface="Wingdings" charset="2"/>
               <a:buChar char=""/>
             </a:pPr>
+            <a:r>
+              <a:rPr b="0" lang="en-CA" sz="2600" spc="-1" strike="noStrike">
+                <a:solidFill>
+                  <a:srgbClr val="333333"/>
+                </a:solidFill>
+                <a:latin typeface="Noto Sans Regular"/>
+              </a:rPr>
+              <a:t>Running nodes 1-by-1 cumbersome </a:t>
+            </a:r>
             <a:endParaRPr b="0" lang="en-CA" sz="2600" spc="-1" strike="noStrike">
               <a:solidFill>
                 <a:srgbClr val="333333"/>
@@ -6030,6 +5847,33 @@
               <a:buFont typeface="Wingdings" charset="2"/>
               <a:buChar char=""/>
             </a:pPr>
+            <a:r>
+              <a:rPr b="0" lang="en-CA" sz="2600" spc="-1" strike="noStrike">
+                <a:solidFill>
+                  <a:srgbClr val="333333"/>
+                </a:solidFill>
+                <a:latin typeface="Noto Sans Regular"/>
+              </a:rPr>
+              <a:t>Can run many nodes in batch using </a:t>
+            </a:r>
+            <a:r>
+              <a:rPr b="1" lang="en-CA" sz="2600" spc="-1" strike="noStrike">
+                <a:solidFill>
+                  <a:srgbClr val="333333"/>
+                </a:solidFill>
+                <a:latin typeface="Noto Sans Regular"/>
+              </a:rPr>
+              <a:t>launch</a:t>
+            </a:r>
+            <a:r>
+              <a:rPr b="0" lang="en-CA" sz="2600" spc="-1" strike="noStrike">
+                <a:solidFill>
+                  <a:srgbClr val="333333"/>
+                </a:solidFill>
+                <a:latin typeface="Noto Sans Regular"/>
+              </a:rPr>
+              <a:t> files</a:t>
+            </a:r>
             <a:endParaRPr b="0" lang="en-CA" sz="2600" spc="-1" strike="noStrike">
               <a:solidFill>
                 <a:srgbClr val="333333"/>
@@ -6049,6 +5893,33 @@
               <a:buFont typeface="Wingdings" charset="2"/>
               <a:buChar char=""/>
             </a:pPr>
+            <a:r>
+              <a:rPr b="0" lang="en-CA" sz="2600" spc="-1" strike="noStrike">
+                <a:solidFill>
+                  <a:srgbClr val="333333"/>
+                </a:solidFill>
+                <a:latin typeface="Courier New"/>
+              </a:rPr>
+              <a:t>roslaunch</a:t>
+            </a:r>
+            <a:r>
+              <a:rPr b="1" lang="en-CA" sz="2600" spc="-1" strike="noStrike">
+                <a:solidFill>
+                  <a:srgbClr val="333333"/>
+                </a:solidFill>
+                <a:latin typeface="Courier New"/>
+              </a:rPr>
+              <a:t> </a:t>
+            </a:r>
+            <a:r>
+              <a:rPr b="0" lang="en-CA" sz="2600" spc="-1" strike="noStrike">
+                <a:solidFill>
+                  <a:srgbClr val="333333"/>
+                </a:solidFill>
+                <a:latin typeface="Courier New"/>
+              </a:rPr>
+              <a:t>&lt;package&gt; &lt;file.launch&gt;</a:t>
+            </a:r>
             <a:endParaRPr b="0" lang="en-CA" sz="2600" spc="-1" strike="noStrike">
               <a:solidFill>
                 <a:srgbClr val="333333"/>
@@ -6068,42 +5939,32 @@
               <a:buFont typeface="Wingdings" charset="2"/>
               <a:buChar char=""/>
             </a:pPr>
-            <a:endParaRPr b="0" lang="en-CA" sz="2600" spc="-1" strike="noStrike">
-              <a:solidFill>
-                <a:srgbClr val="333333"/>
-              </a:solidFill>
-              <a:latin typeface="Noto Sans Regular"/>
-            </a:endParaRPr>
-          </a:p>
-          <a:p>
-            <a:pPr marL="432000" indent="-324000">
-              <a:spcAft>
-                <a:spcPts val="1414"/>
-              </a:spcAft>
-              <a:buClr>
-                <a:srgbClr val="ef2929"/>
-              </a:buClr>
-              <a:buSzPct val="45000"/>
-              <a:buFont typeface="Wingdings" charset="2"/>
-              <a:buChar char=""/>
-            </a:pPr>
+            <a:r>
+              <a:rPr b="1" lang="en-CA" sz="2600" spc="-1" strike="noStrike">
+                <a:solidFill>
+                  <a:srgbClr val="333333"/>
+                </a:solidFill>
+                <a:latin typeface="Courier New"/>
+              </a:rPr>
+              <a:t>Ex: </a:t>
+            </a:r>
             <a:r>
               <a:rPr b="0" lang="en-CA" sz="2600" spc="-1" strike="noStrike">
                 <a:solidFill>
                   <a:srgbClr val="333333"/>
                 </a:solidFill>
-                <a:latin typeface="Noto Sans Regular"/>
-              </a:rPr>
-              <a:t>Read in code with </a:t>
-            </a:r>
-            <a:r>
-              <a:rPr b="1" lang="en-CA" sz="2600" spc="-1" strike="noStrike">
-                <a:solidFill>
-                  <a:srgbClr val="333333"/>
-                </a:solidFill>
-                <a:latin typeface="Noto Sans Regular"/>
-              </a:rPr>
-              <a:t>get_param</a:t>
+                <a:latin typeface="Courier New"/>
+              </a:rPr>
+              <a:t>roslaunch ros_tutorial</a:t>
+            </a:r>
+            <a:r>
+              <a:rPr b="0" lang="en-CA" sz="2600" spc="-1" strike="noStrike">
+                <a:solidFill>
+                  <a:srgbClr val="333333"/>
+                </a:solidFill>
+                <a:latin typeface="Courier New"/>
+              </a:rPr>
+              <a:t> pub_sub.launch</a:t>
             </a:r>
             <a:endParaRPr b="0" lang="en-CA" sz="2600" spc="-1" strike="noStrike">
               <a:solidFill>
@@ -6116,7 +5977,7 @@
       </p:sp>
       <p:pic>
         <p:nvPicPr>
-          <p:cNvPr id="145" name="" descr=""/>
+          <p:cNvPr id="143" name="" descr=""/>
           <p:cNvPicPr/>
           <p:nvPr/>
         </p:nvPicPr>
@@ -6126,8 +5987,8 @@
         </p:blipFill>
         <p:spPr>
           <a:xfrm>
-            <a:off x="1120680" y="2258280"/>
-            <a:ext cx="7735320" cy="1701720"/>
+            <a:off x="576000" y="4680000"/>
+            <a:ext cx="9118080" cy="1800000"/>
           </a:xfrm>
           <a:prstGeom prst="rect">
             <a:avLst/>
@@ -6137,29 +5998,46 @@
           </a:ln>
         </p:spPr>
       </p:pic>
-      <p:pic>
-        <p:nvPicPr>
-          <p:cNvPr id="146" name="" descr=""/>
-          <p:cNvPicPr/>
+      <p:sp>
+        <p:nvSpPr>
+          <p:cNvPr id="144" name="TextShape 3"/>
+          <p:cNvSpPr txBox="1"/>
           <p:nvPr/>
-        </p:nvPicPr>
-        <p:blipFill>
-          <a:blip r:embed="rId2"/>
-          <a:stretch/>
-        </p:blipFill>
-        <p:spPr>
-          <a:xfrm>
-            <a:off x="1080000" y="5256000"/>
-            <a:ext cx="6881040" cy="784800"/>
-          </a:xfrm>
-          <a:prstGeom prst="rect">
-            <a:avLst/>
-          </a:prstGeom>
+        </p:nvSpPr>
+        <p:spPr>
+          <a:xfrm>
+            <a:off x="720000" y="4329720"/>
+            <a:ext cx="4008240" cy="602280"/>
+          </a:xfrm>
+          <a:prstGeom prst="rect">
+            <a:avLst/>
+          </a:prstGeom>
+          <a:noFill/>
           <a:ln>
             <a:noFill/>
           </a:ln>
         </p:spPr>
-      </p:pic>
+        <p:txBody>
+          <a:bodyPr lIns="90000" rIns="90000" tIns="45000" bIns="45000"/>
+          <a:p>
+            <a:r>
+              <a:rPr b="1" lang="en-CA" sz="1800" spc="-1" strike="noStrike">
+                <a:latin typeface="Arial"/>
+              </a:rPr>
+              <a:t>File path:</a:t>
+            </a:r>
+            <a:r>
+              <a:rPr b="0" lang="en-CA" sz="1800" spc="-1" strike="noStrike">
+                <a:latin typeface="Arial"/>
+              </a:rPr>
+              <a:t> /launch/pub_sub.launch</a:t>
+            </a:r>
+            <a:endParaRPr b="0" lang="en-CA" sz="1800" spc="-1" strike="noStrike">
+              <a:latin typeface="Arial"/>
+            </a:endParaRPr>
+          </a:p>
+        </p:txBody>
+      </p:sp>
     </p:spTree>
   </p:cSld>
 </p:sld>
@@ -6184,14 +6062,14 @@
       </p:grpSpPr>
       <p:sp>
         <p:nvSpPr>
-          <p:cNvPr id="147" name="TextShape 1"/>
+          <p:cNvPr id="145" name="TextShape 1"/>
           <p:cNvSpPr txBox="1"/>
           <p:nvPr/>
         </p:nvSpPr>
         <p:spPr>
           <a:xfrm>
-            <a:off x="720000" y="279720"/>
-            <a:ext cx="8855640" cy="1305000"/>
+            <a:off x="720000" y="300960"/>
+            <a:ext cx="8855640" cy="1262520"/>
           </a:xfrm>
           <a:prstGeom prst="rect">
             <a:avLst/>
@@ -6211,7 +6089,7 @@
                 </a:solidFill>
                 <a:latin typeface="Noto Sans Regular"/>
               </a:rPr>
-              <a:t>Tools for Debugging and Data Analysis</a:t>
+              <a:t>Roslaunch with Parameters</a:t>
             </a:r>
             <a:endParaRPr b="1" lang="en-CA" sz="4400" spc="-1" strike="noStrike">
               <a:solidFill>
@@ -6224,13 +6102,13 @@
       </p:sp>
       <p:sp>
         <p:nvSpPr>
-          <p:cNvPr id="148" name="TextShape 2"/>
+          <p:cNvPr id="146" name="TextShape 2"/>
           <p:cNvSpPr txBox="1"/>
           <p:nvPr/>
         </p:nvSpPr>
         <p:spPr>
           <a:xfrm>
-            <a:off x="648000" y="1807200"/>
+            <a:off x="504000" y="1512000"/>
             <a:ext cx="8640000" cy="4384800"/>
           </a:xfrm>
           <a:prstGeom prst="rect">
@@ -6256,15 +6134,15 @@
               <a:buChar char=""/>
             </a:pPr>
             <a:r>
-              <a:rPr b="0" lang="en-CA" sz="2800" spc="-1" strike="noStrike">
+              <a:rPr b="0" lang="en-CA" sz="2600" spc="-1" strike="noStrike">
                 <a:solidFill>
                   <a:srgbClr val="333333"/>
                 </a:solidFill>
                 <a:latin typeface="Noto Sans Regular"/>
               </a:rPr>
-              <a:t>rqt_image_view</a:t>
-            </a:r>
-            <a:endParaRPr b="0" lang="en-CA" sz="2800" spc="-1" strike="noStrike">
+              <a:t>Can run parameters to launch files</a:t>
+            </a:r>
+            <a:endParaRPr b="0" lang="en-CA" sz="2600" spc="-1" strike="noStrike">
               <a:solidFill>
                 <a:srgbClr val="333333"/>
               </a:solidFill>
@@ -6283,16 +6161,7 @@
               <a:buFont typeface="Wingdings" charset="2"/>
               <a:buChar char=""/>
             </a:pPr>
-            <a:r>
-              <a:rPr b="0" lang="en-CA" sz="2800" spc="-1" strike="noStrike">
-                <a:solidFill>
-                  <a:srgbClr val="333333"/>
-                </a:solidFill>
-                <a:latin typeface="Noto Sans Regular"/>
-              </a:rPr>
-              <a:t>rqt_graph</a:t>
-            </a:r>
-            <a:endParaRPr b="0" lang="en-CA" sz="2800" spc="-1" strike="noStrike">
+            <a:endParaRPr b="0" lang="en-CA" sz="2600" spc="-1" strike="noStrike">
               <a:solidFill>
                 <a:srgbClr val="333333"/>
               </a:solidFill>
@@ -6311,16 +6180,7 @@
               <a:buFont typeface="Wingdings" charset="2"/>
               <a:buChar char=""/>
             </a:pPr>
-            <a:r>
-              <a:rPr b="0" lang="en-CA" sz="2800" spc="-1" strike="noStrike">
-                <a:solidFill>
-                  <a:srgbClr val="333333"/>
-                </a:solidFill>
-                <a:latin typeface="Noto Sans Regular"/>
-              </a:rPr>
-              <a:t>rqt_plot</a:t>
-            </a:r>
-            <a:endParaRPr b="0" lang="en-CA" sz="2800" spc="-1" strike="noStrike">
+            <a:endParaRPr b="0" lang="en-CA" sz="2600" spc="-1" strike="noStrike">
               <a:solidFill>
                 <a:srgbClr val="333333"/>
               </a:solidFill>
@@ -6339,24 +6199,117 @@
               <a:buFont typeface="Wingdings" charset="2"/>
               <a:buChar char=""/>
             </a:pPr>
-            <a:r>
-              <a:rPr b="0" lang="en-CA" sz="2800" spc="-1" strike="noStrike">
+            <a:endParaRPr b="0" lang="en-CA" sz="2600" spc="-1" strike="noStrike">
+              <a:solidFill>
+                <a:srgbClr val="333333"/>
+              </a:solidFill>
+              <a:latin typeface="Noto Sans Regular"/>
+            </a:endParaRPr>
+          </a:p>
+          <a:p>
+            <a:pPr marL="432000" indent="-324000">
+              <a:spcAft>
+                <a:spcPts val="1414"/>
+              </a:spcAft>
+              <a:buClr>
+                <a:srgbClr val="ef2929"/>
+              </a:buClr>
+              <a:buSzPct val="45000"/>
+              <a:buFont typeface="Wingdings" charset="2"/>
+              <a:buChar char=""/>
+            </a:pPr>
+            <a:endParaRPr b="0" lang="en-CA" sz="2600" spc="-1" strike="noStrike">
+              <a:solidFill>
+                <a:srgbClr val="333333"/>
+              </a:solidFill>
+              <a:latin typeface="Noto Sans Regular"/>
+            </a:endParaRPr>
+          </a:p>
+          <a:p>
+            <a:pPr marL="432000" indent="-324000">
+              <a:spcAft>
+                <a:spcPts val="1414"/>
+              </a:spcAft>
+              <a:buClr>
+                <a:srgbClr val="ef2929"/>
+              </a:buClr>
+              <a:buSzPct val="45000"/>
+              <a:buFont typeface="Wingdings" charset="2"/>
+              <a:buChar char=""/>
+            </a:pPr>
+            <a:r>
+              <a:rPr b="0" lang="en-CA" sz="2600" spc="-1" strike="noStrike">
                 <a:solidFill>
                   <a:srgbClr val="333333"/>
                 </a:solidFill>
                 <a:latin typeface="Noto Sans Regular"/>
               </a:rPr>
-              <a:t>RVIZ </a:t>
-            </a:r>
-            <a:endParaRPr b="0" lang="en-CA" sz="2800" spc="-1" strike="noStrike">
-              <a:solidFill>
-                <a:srgbClr val="333333"/>
-              </a:solidFill>
-              <a:latin typeface="Noto Sans Regular"/>
-            </a:endParaRPr>
-          </a:p>
-        </p:txBody>
-      </p:sp>
+              <a:t>Read in code with </a:t>
+            </a:r>
+            <a:r>
+              <a:rPr b="1" lang="en-CA" sz="2600" spc="-1" strike="noStrike">
+                <a:solidFill>
+                  <a:srgbClr val="333333"/>
+                </a:solidFill>
+                <a:latin typeface="Noto Sans Regular"/>
+              </a:rPr>
+              <a:t>get_param</a:t>
+            </a:r>
+            <a:endParaRPr b="0" lang="en-CA" sz="2600" spc="-1" strike="noStrike">
+              <a:solidFill>
+                <a:srgbClr val="333333"/>
+              </a:solidFill>
+              <a:latin typeface="Noto Sans Regular"/>
+            </a:endParaRPr>
+          </a:p>
+        </p:txBody>
+      </p:sp>
+      <p:pic>
+        <p:nvPicPr>
+          <p:cNvPr id="147" name="" descr=""/>
+          <p:cNvPicPr/>
+          <p:nvPr/>
+        </p:nvPicPr>
+        <p:blipFill>
+          <a:blip r:embed="rId1"/>
+          <a:stretch/>
+        </p:blipFill>
+        <p:spPr>
+          <a:xfrm>
+            <a:off x="1120680" y="2258280"/>
+            <a:ext cx="7735320" cy="1701720"/>
+          </a:xfrm>
+          <a:prstGeom prst="rect">
+            <a:avLst/>
+          </a:prstGeom>
+          <a:ln>
+            <a:noFill/>
+          </a:ln>
+        </p:spPr>
+      </p:pic>
+      <p:pic>
+        <p:nvPicPr>
+          <p:cNvPr id="148" name="" descr=""/>
+          <p:cNvPicPr/>
+          <p:nvPr/>
+        </p:nvPicPr>
+        <p:blipFill>
+          <a:blip r:embed="rId2"/>
+          <a:stretch/>
+        </p:blipFill>
+        <p:spPr>
+          <a:xfrm>
+            <a:off x="1080000" y="5256000"/>
+            <a:ext cx="6881040" cy="784800"/>
+          </a:xfrm>
+          <a:prstGeom prst="rect">
+            <a:avLst/>
+          </a:prstGeom>
+          <a:ln>
+            <a:noFill/>
+          </a:ln>
+        </p:spPr>
+      </p:pic>
     </p:spTree>
   </p:cSld>
 </p:sld>
@@ -6387,8 +6340,8 @@
         </p:nvSpPr>
         <p:spPr>
           <a:xfrm>
-            <a:off x="720000" y="300960"/>
-            <a:ext cx="8855640" cy="1262520"/>
+            <a:off x="720000" y="279720"/>
+            <a:ext cx="8855640" cy="1305000"/>
           </a:xfrm>
           <a:prstGeom prst="rect">
             <a:avLst/>
@@ -6408,7 +6361,7 @@
                 </a:solidFill>
                 <a:latin typeface="Noto Sans Regular"/>
               </a:rPr>
-              <a:t>rqt_image_view</a:t>
+              <a:t>Tools for Debugging and Data Analysis</a:t>
             </a:r>
             <a:endParaRPr b="1" lang="en-CA" sz="4400" spc="-1" strike="noStrike">
               <a:solidFill>
@@ -6427,8 +6380,8 @@
         </p:nvSpPr>
         <p:spPr>
           <a:xfrm>
-            <a:off x="576000" y="1519200"/>
-            <a:ext cx="8640000" cy="640800"/>
+            <a:off x="648000" y="1807200"/>
+            <a:ext cx="8640000" cy="4384800"/>
           </a:xfrm>
           <a:prstGeom prst="rect">
             <a:avLst/>
@@ -6459,7 +6412,7 @@
                 </a:solidFill>
                 <a:latin typeface="Noto Sans Regular"/>
               </a:rPr>
-              <a:t>Visualize image topics. </a:t>
+              <a:t>rqt_image_view</a:t>
             </a:r>
             <a:endParaRPr b="0" lang="en-CA" sz="2800" spc="-1" strike="noStrike">
               <a:solidFill>
@@ -6468,31 +6421,92 @@
               <a:latin typeface="Noto Sans Regular"/>
             </a:endParaRPr>
           </a:p>
-        </p:txBody>
-      </p:sp>
-      <p:pic>
-        <p:nvPicPr>
-          <p:cNvPr id="151" name="" descr=""/>
-          <p:cNvPicPr/>
-          <p:nvPr/>
-        </p:nvPicPr>
-        <p:blipFill>
-          <a:blip r:embed="rId1"/>
-          <a:stretch/>
-        </p:blipFill>
-        <p:spPr>
-          <a:xfrm>
-            <a:off x="560520" y="2016000"/>
-            <a:ext cx="8583480" cy="4764240"/>
-          </a:xfrm>
-          <a:prstGeom prst="rect">
-            <a:avLst/>
-          </a:prstGeom>
-          <a:ln>
-            <a:noFill/>
-          </a:ln>
-        </p:spPr>
-      </p:pic>
+          <a:p>
+            <a:pPr marL="432000" indent="-324000">
+              <a:spcAft>
+                <a:spcPts val="1414"/>
+              </a:spcAft>
+              <a:buClr>
+                <a:srgbClr val="ef2929"/>
+              </a:buClr>
+              <a:buSzPct val="45000"/>
+              <a:buFont typeface="Wingdings" charset="2"/>
+              <a:buChar char=""/>
+            </a:pPr>
+            <a:r>
+              <a:rPr b="0" lang="en-CA" sz="2800" spc="-1" strike="noStrike">
+                <a:solidFill>
+                  <a:srgbClr val="333333"/>
+                </a:solidFill>
+                <a:latin typeface="Noto Sans Regular"/>
+              </a:rPr>
+              <a:t>rqt_graph</a:t>
+            </a:r>
+            <a:endParaRPr b="0" lang="en-CA" sz="2800" spc="-1" strike="noStrike">
+              <a:solidFill>
+                <a:srgbClr val="333333"/>
+              </a:solidFill>
+              <a:latin typeface="Noto Sans Regular"/>
+            </a:endParaRPr>
+          </a:p>
+          <a:p>
+            <a:pPr marL="432000" indent="-324000">
+              <a:spcAft>
+                <a:spcPts val="1414"/>
+              </a:spcAft>
+              <a:buClr>
+                <a:srgbClr val="ef2929"/>
+              </a:buClr>
+              <a:buSzPct val="45000"/>
+              <a:buFont typeface="Wingdings" charset="2"/>
+              <a:buChar char=""/>
+            </a:pPr>
+            <a:r>
+              <a:rPr b="0" lang="en-CA" sz="2800" spc="-1" strike="noStrike">
+                <a:solidFill>
+                  <a:srgbClr val="333333"/>
+                </a:solidFill>
+                <a:latin typeface="Noto Sans Regular"/>
+              </a:rPr>
+              <a:t>rqt_plot</a:t>
+            </a:r>
+            <a:endParaRPr b="0" lang="en-CA" sz="2800" spc="-1" strike="noStrike">
+              <a:solidFill>
+                <a:srgbClr val="333333"/>
+              </a:solidFill>
+              <a:latin typeface="Noto Sans Regular"/>
+            </a:endParaRPr>
+          </a:p>
+          <a:p>
+            <a:pPr marL="432000" indent="-324000">
+              <a:spcAft>
+                <a:spcPts val="1414"/>
+              </a:spcAft>
+              <a:buClr>
+                <a:srgbClr val="ef2929"/>
+              </a:buClr>
+              <a:buSzPct val="45000"/>
+              <a:buFont typeface="Wingdings" charset="2"/>
+              <a:buChar char=""/>
+            </a:pPr>
+            <a:r>
+              <a:rPr b="0" lang="en-CA" sz="2800" spc="-1" strike="noStrike">
+                <a:solidFill>
+                  <a:srgbClr val="333333"/>
+                </a:solidFill>
+                <a:latin typeface="Noto Sans Regular"/>
+              </a:rPr>
+              <a:t>RVIZ </a:t>
+            </a:r>
+            <a:endParaRPr b="0" lang="en-CA" sz="2800" spc="-1" strike="noStrike">
+              <a:solidFill>
+                <a:srgbClr val="333333"/>
+              </a:solidFill>
+              <a:latin typeface="Noto Sans Regular"/>
+            </a:endParaRPr>
+          </a:p>
+        </p:txBody>
+      </p:sp>
     </p:spTree>
   </p:cSld>
 </p:sld>
@@ -6517,7 +6531,7 @@
       </p:grpSpPr>
       <p:sp>
         <p:nvSpPr>
-          <p:cNvPr id="152" name="TextShape 1"/>
+          <p:cNvPr id="151" name="TextShape 1"/>
           <p:cNvSpPr txBox="1"/>
           <p:nvPr/>
         </p:nvSpPr>
@@ -6544,7 +6558,7 @@
                 </a:solidFill>
                 <a:latin typeface="Noto Sans Regular"/>
               </a:rPr>
-              <a:t>rqt_graph</a:t>
+              <a:t>rqt_image_view</a:t>
             </a:r>
             <a:endParaRPr b="1" lang="en-CA" sz="4400" spc="-1" strike="noStrike">
               <a:solidFill>
@@ -6557,14 +6571,14 @@
       </p:sp>
       <p:sp>
         <p:nvSpPr>
-          <p:cNvPr id="153" name="TextShape 2"/>
+          <p:cNvPr id="152" name="TextShape 2"/>
           <p:cNvSpPr txBox="1"/>
           <p:nvPr/>
         </p:nvSpPr>
         <p:spPr>
           <a:xfrm>
-            <a:off x="648000" y="1656000"/>
-            <a:ext cx="8640000" cy="648000"/>
+            <a:off x="576000" y="1519200"/>
+            <a:ext cx="8640000" cy="640800"/>
           </a:xfrm>
           <a:prstGeom prst="rect">
             <a:avLst/>
@@ -6595,7 +6609,7 @@
                 </a:solidFill>
                 <a:latin typeface="Noto Sans Regular"/>
               </a:rPr>
-              <a:t>Shows list of nodes and their connections </a:t>
+              <a:t>Visualize image topics. </a:t>
             </a:r>
             <a:endParaRPr b="0" lang="en-CA" sz="2800" spc="-1" strike="noStrike">
               <a:solidFill>
@@ -6608,7 +6622,7 @@
       </p:sp>
       <p:pic>
         <p:nvPicPr>
-          <p:cNvPr id="154" name="" descr=""/>
+          <p:cNvPr id="153" name="" descr=""/>
           <p:cNvPicPr/>
           <p:nvPr/>
         </p:nvPicPr>
@@ -6618,8 +6632,8 @@
         </p:blipFill>
         <p:spPr>
           <a:xfrm>
-            <a:off x="2556000" y="2365920"/>
-            <a:ext cx="5580000" cy="4402080"/>
+            <a:off x="560520" y="2016000"/>
+            <a:ext cx="8583480" cy="4764240"/>
           </a:xfrm>
           <a:prstGeom prst="rect">
             <a:avLst/>
@@ -6653,7 +6667,7 @@
       </p:grpSpPr>
       <p:sp>
         <p:nvSpPr>
-          <p:cNvPr id="155" name="TextShape 1"/>
+          <p:cNvPr id="154" name="TextShape 1"/>
           <p:cNvSpPr txBox="1"/>
           <p:nvPr/>
         </p:nvSpPr>
@@ -6680,7 +6694,7 @@
                 </a:solidFill>
                 <a:latin typeface="Noto Sans Regular"/>
               </a:rPr>
-              <a:t>rqt_plot</a:t>
+              <a:t>rqt_graph</a:t>
             </a:r>
             <a:endParaRPr b="1" lang="en-CA" sz="4400" spc="-1" strike="noStrike">
               <a:solidFill>
@@ -6693,14 +6707,14 @@
       </p:sp>
       <p:sp>
         <p:nvSpPr>
-          <p:cNvPr id="156" name="TextShape 2"/>
+          <p:cNvPr id="155" name="TextShape 2"/>
           <p:cNvSpPr txBox="1"/>
           <p:nvPr/>
         </p:nvSpPr>
         <p:spPr>
           <a:xfrm>
-            <a:off x="720000" y="1656000"/>
-            <a:ext cx="8640000" cy="4384800"/>
+            <a:off x="648000" y="1656000"/>
+            <a:ext cx="8640000" cy="648000"/>
           </a:xfrm>
           <a:prstGeom prst="rect">
             <a:avLst/>
@@ -6731,83 +6745,9 @@
                 </a:solidFill>
                 <a:latin typeface="Noto Sans Regular"/>
               </a:rPr>
-              <a:t>Graphs data from one or more topic fields </a:t>
+              <a:t>Shows list of nodes and their connections </a:t>
             </a:r>
             <a:endParaRPr b="0" lang="en-CA" sz="2800" spc="-1" strike="noStrike">
-              <a:solidFill>
-                <a:srgbClr val="333333"/>
-              </a:solidFill>
-              <a:latin typeface="Noto Sans Regular"/>
-            </a:endParaRPr>
-          </a:p>
-          <a:p>
-            <a:pPr marL="432000" indent="-324000">
-              <a:spcAft>
-                <a:spcPts val="1414"/>
-              </a:spcAft>
-              <a:buClr>
-                <a:srgbClr val="ef2929"/>
-              </a:buClr>
-              <a:buSzPct val="45000"/>
-              <a:buFont typeface="Wingdings" charset="2"/>
-              <a:buChar char=""/>
-            </a:pPr>
-            <a:r>
-              <a:rPr b="0" lang="en-CA" sz="2800" spc="-1" strike="noStrike">
-                <a:solidFill>
-                  <a:srgbClr val="333333"/>
-                </a:solidFill>
-                <a:latin typeface="Noto Sans Regular"/>
-              </a:rPr>
-              <a:t>Example: Graph x,y fields of trutle1/pose topic over time. </a:t>
-            </a:r>
-            <a:endParaRPr b="0" lang="en-CA" sz="2800" spc="-1" strike="noStrike">
-              <a:solidFill>
-                <a:srgbClr val="333333"/>
-              </a:solidFill>
-              <a:latin typeface="Noto Sans Regular"/>
-            </a:endParaRPr>
-          </a:p>
-          <a:p>
-            <a:pPr marL="432000" indent="-324000">
-              <a:spcAft>
-                <a:spcPts val="1414"/>
-              </a:spcAft>
-              <a:buClr>
-                <a:srgbClr val="ef2929"/>
-              </a:buClr>
-              <a:buSzPct val="45000"/>
-              <a:buFont typeface="Wingdings" charset="2"/>
-              <a:buChar char=""/>
-            </a:pPr>
-            <a:r>
-              <a:rPr b="0" lang="en-CA" sz="2600" spc="-1" strike="noStrike">
-                <a:solidFill>
-                  <a:srgbClr val="333333"/>
-                </a:solidFill>
-                <a:latin typeface="Courier New"/>
-              </a:rPr>
-              <a:t>rqt_plot </a:t>
-            </a:r>
-            <a:r>
-              <a:rPr b="0" i="1" lang="en-CA" sz="2600" spc="-1" strike="noStrike">
-                <a:solidFill>
-                  <a:srgbClr val="333333"/>
-                </a:solidFill>
-                <a:latin typeface="Courier New"/>
-              </a:rPr>
-              <a:t>turtle1/</a:t>
-            </a:r>
-            <a:r>
-              <a:rPr b="0" lang="en-CA" sz="2600" spc="-1" strike="noStrike">
-                <a:solidFill>
-                  <a:srgbClr val="333333"/>
-                </a:solidFill>
-                <a:latin typeface="Courier New"/>
-              </a:rPr>
-              <a:t>pose/x, turtle1/pose/y</a:t>
-            </a:r>
-            <a:endParaRPr b="0" lang="en-CA" sz="2600" spc="-1" strike="noStrike">
               <a:solidFill>
                 <a:srgbClr val="333333"/>
               </a:solidFill>
@@ -6818,7 +6758,7 @@
       </p:sp>
       <p:pic>
         <p:nvPicPr>
-          <p:cNvPr id="157" name="" descr=""/>
+          <p:cNvPr id="156" name="" descr=""/>
           <p:cNvPicPr/>
           <p:nvPr/>
         </p:nvPicPr>
@@ -6828,8 +6768,8 @@
         </p:blipFill>
         <p:spPr>
           <a:xfrm>
-            <a:off x="2160000" y="3960000"/>
-            <a:ext cx="5695560" cy="2171520"/>
+            <a:off x="2556000" y="2365920"/>
+            <a:ext cx="5580000" cy="4402080"/>
           </a:xfrm>
           <a:prstGeom prst="rect">
             <a:avLst/>
@@ -6890,7 +6830,7 @@
                 </a:solidFill>
                 <a:latin typeface="Noto Sans Regular"/>
               </a:rPr>
-              <a:t>What is ROS?</a:t>
+              <a:t>Tutorial Code</a:t>
             </a:r>
             <a:endParaRPr b="1" lang="en-CA" sz="4400" spc="-1" strike="noStrike">
               <a:solidFill>
@@ -6941,7 +6881,25 @@
                 </a:solidFill>
                 <a:latin typeface="Noto Sans Regular"/>
               </a:rPr>
-              <a:t>ROS is an open-source, meta-operating system for your robot. It provides the services you would expect from an operating system, including: </a:t>
+              <a:t>In the second part of the tutorial we’ll be looking </a:t>
+            </a:r>
+            <a:r>
+              <a:rPr b="0" lang="en-CA" sz="2600" spc="-1" strike="noStrike">
+                <a:solidFill>
+                  <a:srgbClr val="333333"/>
+                </a:solidFill>
+                <a:latin typeface="Noto Sans Regular"/>
+              </a:rPr>
+              <a:t>at running some ROS code on the lab computers </a:t>
+            </a:r>
+            <a:r>
+              <a:rPr b="0" lang="en-CA" sz="2600" spc="-1" strike="noStrike">
+                <a:solidFill>
+                  <a:srgbClr val="333333"/>
+                </a:solidFill>
+                <a:latin typeface="Noto Sans Regular"/>
+              </a:rPr>
+              <a:t>(Trottier 3120)</a:t>
             </a:r>
             <a:endParaRPr b="0" lang="en-CA" sz="2600" spc="-1" strike="noStrike">
               <a:solidFill>
@@ -6969,7 +6927,7 @@
                 </a:solidFill>
                 <a:latin typeface="Noto Sans Regular"/>
               </a:rPr>
-              <a:t>message-passing between processes</a:t>
+              <a:t>You can find the code repository here:</a:t>
             </a:r>
             <a:endParaRPr b="0" lang="en-CA" sz="2600" spc="-1" strike="noStrike">
               <a:solidFill>
@@ -6996,8 +6954,9 @@
                   <a:srgbClr val="333333"/>
                 </a:solidFill>
                 <a:latin typeface="Noto Sans Regular"/>
-              </a:rPr>
-              <a:t>hardware abstraction</a:t>
+                <a:hlinkClick r:id="rId1"/>
+              </a:rPr>
+              <a:t>https://github.com/comp417-fall2019-tutorials/ros_tutorial</a:t>
             </a:r>
             <a:endParaRPr b="0" lang="en-CA" sz="2600" spc="-1" strike="noStrike">
               <a:solidFill>
@@ -7018,15 +6977,6 @@
               <a:buFont typeface="Wingdings" charset="2"/>
               <a:buChar char=""/>
             </a:pPr>
-            <a:r>
-              <a:rPr b="0" lang="en-CA" sz="2600" spc="-1" strike="noStrike">
-                <a:solidFill>
-                  <a:srgbClr val="333333"/>
-                </a:solidFill>
-                <a:latin typeface="Noto Sans Regular"/>
-              </a:rPr>
-              <a:t>low-level device control</a:t>
-            </a:r>
             <a:endParaRPr b="0" lang="en-CA" sz="2600" spc="-1" strike="noStrike">
               <a:solidFill>
                 <a:srgbClr val="333333"/>
@@ -7053,7 +7003,25 @@
                 </a:solidFill>
                 <a:latin typeface="Noto Sans Regular"/>
               </a:rPr>
-              <a:t>implementation of commonly-used functionality</a:t>
+              <a:t>See the </a:t>
+            </a:r>
+            <a:r>
+              <a:rPr b="1" lang="en-CA" sz="2600" spc="-1" strike="noStrike">
+                <a:solidFill>
+                  <a:srgbClr val="333333"/>
+                </a:solidFill>
+                <a:latin typeface="Noto Sans Regular"/>
+              </a:rPr>
+              <a:t>README.md</a:t>
+            </a:r>
+            <a:r>
+              <a:rPr b="0" lang="en-CA" sz="2600" spc="-1" strike="noStrike">
+                <a:solidFill>
+                  <a:srgbClr val="333333"/>
+                </a:solidFill>
+                <a:latin typeface="Noto Sans Regular"/>
+              </a:rPr>
+              <a:t> file for instructions</a:t>
             </a:r>
             <a:endParaRPr b="0" lang="en-CA" sz="2600" spc="-1" strike="noStrike">
               <a:solidFill>
@@ -7074,15 +7042,6 @@
               <a:buFont typeface="Wingdings" charset="2"/>
               <a:buChar char=""/>
             </a:pPr>
-            <a:r>
-              <a:rPr b="0" lang="en-CA" sz="2600" spc="-1" strike="noStrike">
-                <a:solidFill>
-                  <a:srgbClr val="333333"/>
-                </a:solidFill>
-                <a:latin typeface="Noto Sans Regular"/>
-              </a:rPr>
-              <a:t>package management</a:t>
-            </a:r>
             <a:endParaRPr b="0" lang="en-CA" sz="2600" spc="-1" strike="noStrike">
               <a:solidFill>
                 <a:srgbClr val="333333"/>
@@ -7090,52 +7049,23 @@
               <a:latin typeface="Noto Sans Regular"/>
             </a:endParaRPr>
           </a:p>
-        </p:txBody>
-      </p:sp>
-      <p:sp>
-        <p:nvSpPr>
-          <p:cNvPr id="90" name="TextShape 3"/>
-          <p:cNvSpPr txBox="1"/>
-          <p:nvPr/>
-        </p:nvSpPr>
-        <p:spPr>
-          <a:xfrm>
-            <a:off x="955440" y="5976000"/>
-            <a:ext cx="4300560" cy="360000"/>
-          </a:xfrm>
-          <a:prstGeom prst="rect">
-            <a:avLst/>
-          </a:prstGeom>
-          <a:noFill/>
-          <a:ln>
-            <a:noFill/>
-          </a:ln>
-        </p:spPr>
-        <p:txBody>
-          <a:bodyPr lIns="90000" rIns="90000" tIns="45000" bIns="45000"/>
-          <a:p>
-            <a:r>
-              <a:rPr b="0" i="1" lang="en-CA" sz="1600" spc="-1" strike="noStrike" u="sng">
-                <a:uFillTx/>
-                <a:latin typeface="Arial"/>
-              </a:rPr>
-              <a:t>Source:</a:t>
-            </a:r>
-            <a:r>
-              <a:rPr b="0" lang="en-CA" sz="1600" spc="-1" strike="noStrike">
-                <a:latin typeface="Arial"/>
-              </a:rPr>
-              <a:t> </a:t>
-            </a:r>
-            <a:r>
-              <a:rPr b="0" lang="en-CA" sz="1600" spc="-1" strike="noStrike">
-                <a:latin typeface="Arial"/>
-                <a:hlinkClick r:id="rId1"/>
-              </a:rPr>
-              <a:t>http://wiki.ros.org/ROS/Introduction</a:t>
-            </a:r>
-            <a:endParaRPr b="0" lang="en-CA" sz="1600" spc="-1" strike="noStrike">
-              <a:latin typeface="Arial"/>
+          <a:p>
+            <a:pPr marL="432000" indent="-324000">
+              <a:spcAft>
+                <a:spcPts val="1414"/>
+              </a:spcAft>
+              <a:buClr>
+                <a:srgbClr val="ef2929"/>
+              </a:buClr>
+              <a:buSzPct val="45000"/>
+              <a:buFont typeface="Wingdings" charset="2"/>
+              <a:buChar char=""/>
+            </a:pPr>
+            <a:endParaRPr b="0" lang="en-CA" sz="2600" spc="-1" strike="noStrike">
+              <a:solidFill>
+                <a:srgbClr val="333333"/>
+              </a:solidFill>
+              <a:latin typeface="Noto Sans Regular"/>
             </a:endParaRPr>
           </a:p>
         </p:txBody>
@@ -7145,10 +7075,10 @@
   <p:timing>
     <p:tnLst>
       <p:par>
-        <p:cTn id="3" dur="indefinite" restart="never" nodeType="tmRoot">
+        <p:cTn id="1" dur="indefinite" restart="never" nodeType="tmRoot">
           <p:childTnLst>
             <p:seq>
-              <p:cTn id="4" dur="indefinite" nodeType="mainSeq"/>
+              <p:cTn id="2" dur="indefinite" nodeType="mainSeq"/>
               <p:prevCondLst>
                 <p:cond delay="0" evt="onPrev">
                   <p:tgtEl>
@@ -7191,7 +7121,7 @@
       </p:grpSpPr>
       <p:sp>
         <p:nvSpPr>
-          <p:cNvPr id="158" name="TextShape 1"/>
+          <p:cNvPr id="157" name="TextShape 1"/>
           <p:cNvSpPr txBox="1"/>
           <p:nvPr/>
         </p:nvSpPr>
@@ -7218,7 +7148,7 @@
                 </a:solidFill>
                 <a:latin typeface="Noto Sans Regular"/>
               </a:rPr>
-              <a:t>RVIZ (ROS Visualization)</a:t>
+              <a:t>rqt_plot</a:t>
             </a:r>
             <a:endParaRPr b="1" lang="en-CA" sz="4400" spc="-1" strike="noStrike">
               <a:solidFill>
@@ -7231,14 +7161,14 @@
       </p:sp>
       <p:sp>
         <p:nvSpPr>
-          <p:cNvPr id="159" name="TextShape 2"/>
+          <p:cNvPr id="158" name="TextShape 2"/>
           <p:cNvSpPr txBox="1"/>
           <p:nvPr/>
         </p:nvSpPr>
         <p:spPr>
           <a:xfrm>
-            <a:off x="576000" y="1440000"/>
-            <a:ext cx="8640000" cy="1728000"/>
+            <a:off x="720000" y="1656000"/>
+            <a:ext cx="8640000" cy="4384800"/>
           </a:xfrm>
           <a:prstGeom prst="rect">
             <a:avLst/>
@@ -7269,7 +7199,7 @@
                 </a:solidFill>
                 <a:latin typeface="Noto Sans Regular"/>
               </a:rPr>
-              <a:t>General purpose 3D visualization for ROS</a:t>
+              <a:t>Graphs data from one or more topic fields </a:t>
             </a:r>
             <a:endParaRPr b="0" lang="en-CA" sz="2800" spc="-1" strike="noStrike">
               <a:solidFill>
@@ -7297,9 +7227,55 @@
                 </a:solidFill>
                 <a:latin typeface="Noto Sans Regular"/>
               </a:rPr>
-              <a:t>Can visualize lidar scans, coordinate frames, point clouds, etc.</a:t>
+              <a:t>Example: Graph x,y fields of trutle1/pose topic over time. </a:t>
             </a:r>
             <a:endParaRPr b="0" lang="en-CA" sz="2800" spc="-1" strike="noStrike">
+              <a:solidFill>
+                <a:srgbClr val="333333"/>
+              </a:solidFill>
+              <a:latin typeface="Noto Sans Regular"/>
+            </a:endParaRPr>
+          </a:p>
+          <a:p>
+            <a:pPr marL="432000" indent="-324000">
+              <a:spcAft>
+                <a:spcPts val="1414"/>
+              </a:spcAft>
+              <a:buClr>
+                <a:srgbClr val="ef2929"/>
+              </a:buClr>
+              <a:buSzPct val="45000"/>
+              <a:buFont typeface="Wingdings" charset="2"/>
+              <a:buChar char=""/>
+            </a:pPr>
+            <a:r>
+              <a:rPr b="0" lang="en-CA" sz="2600" spc="-1" strike="noStrike">
+                <a:solidFill>
+                  <a:srgbClr val="333333"/>
+                </a:solidFill>
+                <a:latin typeface="Courier New"/>
+              </a:rPr>
+              <a:t>rqt_plot </a:t>
+            </a:r>
+            <a:r>
+              <a:rPr b="0" i="1" lang="en-CA" sz="2600" spc="-1" strike="noStrike">
+                <a:solidFill>
+                  <a:srgbClr val="333333"/>
+                </a:solidFill>
+                <a:latin typeface="Courier New"/>
+              </a:rPr>
+              <a:t>turtle1/</a:t>
+            </a:r>
+            <a:r>
+              <a:rPr b="0" lang="en-CA" sz="2600" spc="-1" strike="noStrike">
+                <a:solidFill>
+                  <a:srgbClr val="333333"/>
+                </a:solidFill>
+                <a:latin typeface="Courier New"/>
+              </a:rPr>
+              <a:t>pose/x, turtle1/pose/y</a:t>
+            </a:r>
+            <a:endParaRPr b="0" lang="en-CA" sz="2600" spc="-1" strike="noStrike">
               <a:solidFill>
                 <a:srgbClr val="333333"/>
               </a:solidFill>
@@ -7310,7 +7286,7 @@
       </p:sp>
       <p:pic>
         <p:nvPicPr>
-          <p:cNvPr id="160" name="" descr=""/>
+          <p:cNvPr id="159" name="" descr=""/>
           <p:cNvPicPr/>
           <p:nvPr/>
         </p:nvPicPr>
@@ -7320,8 +7296,8 @@
         </p:blipFill>
         <p:spPr>
           <a:xfrm>
-            <a:off x="2448000" y="2961720"/>
-            <a:ext cx="7200000" cy="4454280"/>
+            <a:off x="2160000" y="3960000"/>
+            <a:ext cx="5695560" cy="2171520"/>
           </a:xfrm>
           <a:prstGeom prst="rect">
             <a:avLst/>
@@ -7355,14 +7331,14 @@
       </p:grpSpPr>
       <p:sp>
         <p:nvSpPr>
-          <p:cNvPr id="161" name="TextShape 1"/>
+          <p:cNvPr id="160" name="TextShape 1"/>
           <p:cNvSpPr txBox="1"/>
           <p:nvPr/>
         </p:nvSpPr>
         <p:spPr>
           <a:xfrm>
-            <a:off x="720000" y="279720"/>
-            <a:ext cx="8855640" cy="1305000"/>
+            <a:off x="720000" y="300960"/>
+            <a:ext cx="8855640" cy="1262520"/>
           </a:xfrm>
           <a:prstGeom prst="rect">
             <a:avLst/>
@@ -7382,7 +7358,7 @@
                 </a:solidFill>
                 <a:latin typeface="Noto Sans Regular"/>
               </a:rPr>
-              <a:t>TF Package for Coordinate Frame Transforms</a:t>
+              <a:t>RVIZ (ROS Visualization)</a:t>
             </a:r>
             <a:endParaRPr b="1" lang="en-CA" sz="4400" spc="-1" strike="noStrike">
               <a:solidFill>
@@ -7395,14 +7371,14 @@
       </p:sp>
       <p:sp>
         <p:nvSpPr>
-          <p:cNvPr id="162" name="TextShape 2"/>
+          <p:cNvPr id="161" name="TextShape 2"/>
           <p:cNvSpPr txBox="1"/>
           <p:nvPr/>
         </p:nvSpPr>
         <p:spPr>
           <a:xfrm>
-            <a:off x="432000" y="1872000"/>
-            <a:ext cx="8640000" cy="4384800"/>
+            <a:off x="576000" y="1440000"/>
+            <a:ext cx="8640000" cy="1728000"/>
           </a:xfrm>
           <a:prstGeom prst="rect">
             <a:avLst/>
@@ -7427,15 +7403,15 @@
               <a:buChar char=""/>
             </a:pPr>
             <a:r>
-              <a:rPr b="0" lang="en-CA" sz="2600" spc="-1" strike="noStrike">
+              <a:rPr b="0" lang="en-CA" sz="2800" spc="-1" strike="noStrike">
                 <a:solidFill>
                   <a:srgbClr val="333333"/>
                 </a:solidFill>
                 <a:latin typeface="Noto Sans Regular"/>
               </a:rPr>
-              <a:t>TF package handles transforms between coordinate frames over time</a:t>
-            </a:r>
-            <a:endParaRPr b="0" lang="en-CA" sz="2600" spc="-1" strike="noStrike">
+              <a:t>General purpose 3D visualization for ROS</a:t>
+            </a:r>
+            <a:endParaRPr b="0" lang="en-CA" sz="2800" spc="-1" strike="noStrike">
               <a:solidFill>
                 <a:srgbClr val="333333"/>
               </a:solidFill>
@@ -7455,53 +7431,15 @@
               <a:buChar char=""/>
             </a:pPr>
             <a:r>
-              <a:rPr b="0" lang="en-CA" sz="2600" spc="-1" strike="noStrike">
+              <a:rPr b="0" lang="en-CA" sz="2800" spc="-1" strike="noStrike">
                 <a:solidFill>
                   <a:srgbClr val="333333"/>
                 </a:solidFill>
                 <a:latin typeface="Noto Sans Regular"/>
               </a:rPr>
-              <a:t>tf_echo: Prints updated transforms in console</a:t>
-            </a:r>
-            <a:endParaRPr b="0" lang="en-CA" sz="2600" spc="-1" strike="noStrike">
-              <a:solidFill>
-                <a:srgbClr val="333333"/>
-              </a:solidFill>
-              <a:latin typeface="Noto Sans Regular"/>
-            </a:endParaRPr>
-          </a:p>
-          <a:p>
-            <a:pPr marL="432000" indent="-324000">
-              <a:spcAft>
-                <a:spcPts val="1414"/>
-              </a:spcAft>
-              <a:buClr>
-                <a:srgbClr val="ef2929"/>
-              </a:buClr>
-              <a:buSzPct val="45000"/>
-              <a:buFont typeface="Wingdings" charset="2"/>
-              <a:buChar char=""/>
-            </a:pPr>
-            <a:r>
-              <a:rPr b="0" lang="en-CA" sz="2600" spc="-1" strike="noStrike">
-                <a:solidFill>
-                  <a:srgbClr val="333333"/>
-                </a:solidFill>
-                <a:latin typeface="Noto Sans Regular"/>
-              </a:rPr>
-              <a:t>Example: </a:t>
-            </a:r>
-            <a:br/>
-            <a:r>
-              <a:rPr b="0" lang="en-CA" sz="2600" spc="-1" strike="noStrike">
-                <a:solidFill>
-                  <a:srgbClr val="333333"/>
-                </a:solidFill>
-                <a:latin typeface="Courier New"/>
-              </a:rPr>
-              <a:t>rosrun tf tf_echo [reference_frame] [target_frame]</a:t>
-            </a:r>
-            <a:endParaRPr b="0" lang="en-CA" sz="2600" spc="-1" strike="noStrike">
+              <a:t>Can visualize lidar scans, coordinate frames, point clouds, etc.</a:t>
+            </a:r>
+            <a:endParaRPr b="0" lang="en-CA" sz="2800" spc="-1" strike="noStrike">
               <a:solidFill>
                 <a:srgbClr val="333333"/>
               </a:solidFill>
@@ -7512,7 +7450,7 @@
       </p:sp>
       <p:pic>
         <p:nvPicPr>
-          <p:cNvPr id="163" name="" descr=""/>
+          <p:cNvPr id="162" name="" descr=""/>
           <p:cNvPicPr/>
           <p:nvPr/>
         </p:nvPicPr>
@@ -7522,8 +7460,8 @@
         </p:blipFill>
         <p:spPr>
           <a:xfrm>
-            <a:off x="4923000" y="4176000"/>
-            <a:ext cx="3645000" cy="3240000"/>
+            <a:off x="2448000" y="2961720"/>
+            <a:ext cx="7200000" cy="4454280"/>
           </a:xfrm>
           <a:prstGeom prst="rect">
             <a:avLst/>
@@ -7533,54 +7471,6 @@
           </a:ln>
         </p:spPr>
       </p:pic>
-      <p:sp>
-        <p:nvSpPr>
-          <p:cNvPr id="164" name="TextShape 3"/>
-          <p:cNvSpPr txBox="1"/>
-          <p:nvPr/>
-        </p:nvSpPr>
-        <p:spPr>
-          <a:xfrm>
-            <a:off x="792000" y="4752000"/>
-            <a:ext cx="2664000" cy="316080"/>
-          </a:xfrm>
-          <a:prstGeom prst="rect">
-            <a:avLst/>
-          </a:prstGeom>
-          <a:noFill/>
-          <a:ln>
-            <a:noFill/>
-          </a:ln>
-        </p:spPr>
-        <p:txBody>
-          <a:bodyPr lIns="90000" rIns="90000" tIns="45000" bIns="45000"/>
-          <a:p>
-            <a:r>
-              <a:rPr b="0" lang="en-CA" sz="1600" spc="-1" strike="noStrike" u="sng">
-                <a:uFillTx/>
-                <a:latin typeface="Arial"/>
-              </a:rPr>
-              <a:t>Source:</a:t>
-            </a:r>
-            <a:r>
-              <a:rPr b="0" lang="en-CA" sz="1600" spc="-1" strike="noStrike">
-                <a:latin typeface="Arial"/>
-              </a:rPr>
-              <a:t> </a:t>
-            </a:r>
-            <a:r>
-              <a:rPr b="0" lang="en-CA" sz="1600" spc="-1" strike="noStrike">
-                <a:latin typeface="Arial"/>
-                <a:hlinkClick r:id="rId2"/>
-              </a:rPr>
-              <a:t>http://wiki.ros.org/tf</a:t>
-            </a:r>
-            <a:endParaRPr b="0" lang="en-CA" sz="1600" spc="-1" strike="noStrike">
-              <a:latin typeface="Arial"/>
-            </a:endParaRPr>
-          </a:p>
-        </p:txBody>
-      </p:sp>
     </p:spTree>
   </p:cSld>
 </p:sld>
@@ -7605,14 +7495,14 @@
       </p:grpSpPr>
       <p:sp>
         <p:nvSpPr>
-          <p:cNvPr id="165" name="TextShape 1"/>
+          <p:cNvPr id="163" name="TextShape 1"/>
           <p:cNvSpPr txBox="1"/>
           <p:nvPr/>
         </p:nvSpPr>
         <p:spPr>
           <a:xfrm>
-            <a:off x="720000" y="300960"/>
-            <a:ext cx="8855640" cy="1262520"/>
+            <a:off x="720000" y="279720"/>
+            <a:ext cx="8855640" cy="1305000"/>
           </a:xfrm>
           <a:prstGeom prst="rect">
             <a:avLst/>
@@ -7632,7 +7522,7 @@
                 </a:solidFill>
                 <a:latin typeface="Noto Sans Regular"/>
               </a:rPr>
-              <a:t>Rosbag</a:t>
+              <a:t>TF Package for Coordinate Frame Transforms</a:t>
             </a:r>
             <a:endParaRPr b="1" lang="en-CA" sz="4400" spc="-1" strike="noStrike">
               <a:solidFill>
@@ -7645,14 +7535,14 @@
       </p:sp>
       <p:sp>
         <p:nvSpPr>
-          <p:cNvPr id="166" name="TextShape 2"/>
+          <p:cNvPr id="164" name="TextShape 2"/>
           <p:cNvSpPr txBox="1"/>
           <p:nvPr/>
         </p:nvSpPr>
         <p:spPr>
           <a:xfrm>
-            <a:off x="432000" y="1563480"/>
-            <a:ext cx="9000000" cy="2612520"/>
+            <a:off x="432000" y="1872000"/>
+            <a:ext cx="8640000" cy="4384800"/>
           </a:xfrm>
           <a:prstGeom prst="rect">
             <a:avLst/>
@@ -7677,16 +7567,15 @@
               <a:buChar char=""/>
             </a:pPr>
             <a:r>
-              <a:rPr b="0" lang="en-CA" sz="2800" spc="-1" strike="noStrike" u="sng">
-                <a:solidFill>
-                  <a:srgbClr val="333333"/>
-                </a:solidFill>
-                <a:uFillTx/>
+              <a:rPr b="0" lang="en-CA" sz="2600" spc="-1" strike="noStrike">
+                <a:solidFill>
+                  <a:srgbClr val="333333"/>
+                </a:solidFill>
                 <a:latin typeface="Noto Sans Regular"/>
               </a:rPr>
-              <a:t>Motivation: </a:t>
-            </a:r>
-            <a:endParaRPr b="0" lang="en-CA" sz="2800" spc="-1" strike="noStrike">
+              <a:t>TF package handles transforms between coordinate frames over time</a:t>
+            </a:r>
+            <a:endParaRPr b="0" lang="en-CA" sz="2600" spc="-1" strike="noStrike">
               <a:solidFill>
                 <a:srgbClr val="333333"/>
               </a:solidFill>
@@ -7706,15 +7595,15 @@
               <a:buChar char=""/>
             </a:pPr>
             <a:r>
-              <a:rPr b="0" lang="en-CA" sz="2800" spc="-1" strike="noStrike">
+              <a:rPr b="0" lang="en-CA" sz="2600" spc="-1" strike="noStrike">
                 <a:solidFill>
                   <a:srgbClr val="333333"/>
                 </a:solidFill>
                 <a:latin typeface="Noto Sans Regular"/>
               </a:rPr>
-              <a:t>Real-world robotics experiments subject to high amounts of variability</a:t>
-            </a:r>
-            <a:endParaRPr b="0" lang="en-CA" sz="2800" spc="-1" strike="noStrike">
+              <a:t>tf_echo: Prints updated transforms in console</a:t>
+            </a:r>
+            <a:endParaRPr b="0" lang="en-CA" sz="2600" spc="-1" strike="noStrike">
               <a:solidFill>
                 <a:srgbClr val="333333"/>
               </a:solidFill>
@@ -7734,6 +7623,257 @@
               <a:buChar char=""/>
             </a:pPr>
             <a:r>
+              <a:rPr b="0" lang="en-CA" sz="2600" spc="-1" strike="noStrike">
+                <a:solidFill>
+                  <a:srgbClr val="333333"/>
+                </a:solidFill>
+                <a:latin typeface="Noto Sans Regular"/>
+              </a:rPr>
+              <a:t>Example: </a:t>
+            </a:r>
+            <a:br/>
+            <a:r>
+              <a:rPr b="0" lang="en-CA" sz="2600" spc="-1" strike="noStrike">
+                <a:solidFill>
+                  <a:srgbClr val="333333"/>
+                </a:solidFill>
+                <a:latin typeface="Courier New"/>
+              </a:rPr>
+              <a:t>rosrun tf tf_echo [reference_frame] [target_frame]</a:t>
+            </a:r>
+            <a:endParaRPr b="0" lang="en-CA" sz="2600" spc="-1" strike="noStrike">
+              <a:solidFill>
+                <a:srgbClr val="333333"/>
+              </a:solidFill>
+              <a:latin typeface="Noto Sans Regular"/>
+            </a:endParaRPr>
+          </a:p>
+        </p:txBody>
+      </p:sp>
+      <p:pic>
+        <p:nvPicPr>
+          <p:cNvPr id="165" name="" descr=""/>
+          <p:cNvPicPr/>
+          <p:nvPr/>
+        </p:nvPicPr>
+        <p:blipFill>
+          <a:blip r:embed="rId1"/>
+          <a:stretch/>
+        </p:blipFill>
+        <p:spPr>
+          <a:xfrm>
+            <a:off x="4923000" y="4176000"/>
+            <a:ext cx="3645000" cy="3240000"/>
+          </a:xfrm>
+          <a:prstGeom prst="rect">
+            <a:avLst/>
+          </a:prstGeom>
+          <a:ln>
+            <a:noFill/>
+          </a:ln>
+        </p:spPr>
+      </p:pic>
+      <p:sp>
+        <p:nvSpPr>
+          <p:cNvPr id="166" name="TextShape 3"/>
+          <p:cNvSpPr txBox="1"/>
+          <p:nvPr/>
+        </p:nvSpPr>
+        <p:spPr>
+          <a:xfrm>
+            <a:off x="792000" y="4752000"/>
+            <a:ext cx="2664000" cy="316080"/>
+          </a:xfrm>
+          <a:prstGeom prst="rect">
+            <a:avLst/>
+          </a:prstGeom>
+          <a:noFill/>
+          <a:ln>
+            <a:noFill/>
+          </a:ln>
+        </p:spPr>
+        <p:txBody>
+          <a:bodyPr lIns="90000" rIns="90000" tIns="45000" bIns="45000"/>
+          <a:p>
+            <a:r>
+              <a:rPr b="0" lang="en-CA" sz="1600" spc="-1" strike="noStrike" u="sng">
+                <a:uFillTx/>
+                <a:latin typeface="Arial"/>
+              </a:rPr>
+              <a:t>Source:</a:t>
+            </a:r>
+            <a:r>
+              <a:rPr b="0" lang="en-CA" sz="1600" spc="-1" strike="noStrike">
+                <a:latin typeface="Arial"/>
+              </a:rPr>
+              <a:t> </a:t>
+            </a:r>
+            <a:r>
+              <a:rPr b="0" lang="en-CA" sz="1600" spc="-1" strike="noStrike">
+                <a:latin typeface="Arial"/>
+                <a:hlinkClick r:id="rId2"/>
+              </a:rPr>
+              <a:t>http://wiki.ros.org/tf</a:t>
+            </a:r>
+            <a:endParaRPr b="0" lang="en-CA" sz="1600" spc="-1" strike="noStrike">
+              <a:latin typeface="Arial"/>
+            </a:endParaRPr>
+          </a:p>
+        </p:txBody>
+      </p:sp>
+    </p:spTree>
+  </p:cSld>
+</p:sld>
+</file>
+
+<file path=ppt/slides/slide23.xml><?xml version="1.0" encoding="utf-8"?>
+<p:sld xmlns:a="http://schemas.openxmlformats.org/drawingml/2006/main" xmlns:p="http://schemas.openxmlformats.org/presentationml/2006/main" xmlns:r="http://schemas.openxmlformats.org/officeDocument/2006/relationships" xmlns:p14="http://schemas.microsoft.com/office/powerpoint/2010/main" xmlns:p15="http://schemas.microsoft.com/office/powerpoint/2012/main" xmlns:mc="http://schemas.openxmlformats.org/markup-compatibility/2006">
+  <p:cSld>
+    <p:spTree>
+      <p:nvGrpSpPr>
+        <p:cNvPr id="1" name=""/>
+        <p:cNvGrpSpPr/>
+        <p:nvPr/>
+      </p:nvGrpSpPr>
+      <p:grpSpPr>
+        <a:xfrm>
+          <a:off x="0" y="0"/>
+          <a:ext cx="0" cy="0"/>
+          <a:chOff x="0" y="0"/>
+          <a:chExt cx="0" cy="0"/>
+        </a:xfrm>
+      </p:grpSpPr>
+      <p:sp>
+        <p:nvSpPr>
+          <p:cNvPr id="167" name="TextShape 1"/>
+          <p:cNvSpPr txBox="1"/>
+          <p:nvPr/>
+        </p:nvSpPr>
+        <p:spPr>
+          <a:xfrm>
+            <a:off x="720000" y="300960"/>
+            <a:ext cx="8855640" cy="1262520"/>
+          </a:xfrm>
+          <a:prstGeom prst="rect">
+            <a:avLst/>
+          </a:prstGeom>
+          <a:noFill/>
+          <a:ln>
+            <a:noFill/>
+          </a:ln>
+        </p:spPr>
+        <p:txBody>
+          <a:bodyPr lIns="0" rIns="0" tIns="0" bIns="0" anchor="ctr"/>
+          <a:p>
+            <a:r>
+              <a:rPr b="1" lang="en-CA" sz="4400" spc="-1" strike="noStrike">
+                <a:solidFill>
+                  <a:srgbClr val="333333"/>
+                </a:solidFill>
+                <a:latin typeface="Noto Sans Regular"/>
+              </a:rPr>
+              <a:t>Rosbag</a:t>
+            </a:r>
+            <a:endParaRPr b="1" lang="en-CA" sz="4400" spc="-1" strike="noStrike">
+              <a:solidFill>
+                <a:srgbClr val="333333"/>
+              </a:solidFill>
+              <a:latin typeface="Noto Sans Regular"/>
+            </a:endParaRPr>
+          </a:p>
+        </p:txBody>
+      </p:sp>
+      <p:sp>
+        <p:nvSpPr>
+          <p:cNvPr id="168" name="TextShape 2"/>
+          <p:cNvSpPr txBox="1"/>
+          <p:nvPr/>
+        </p:nvSpPr>
+        <p:spPr>
+          <a:xfrm>
+            <a:off x="432000" y="1563480"/>
+            <a:ext cx="9000000" cy="2612520"/>
+          </a:xfrm>
+          <a:prstGeom prst="rect">
+            <a:avLst/>
+          </a:prstGeom>
+          <a:noFill/>
+          <a:ln>
+            <a:noFill/>
+          </a:ln>
+        </p:spPr>
+        <p:txBody>
+          <a:bodyPr lIns="0" rIns="0" tIns="0" bIns="0"/>
+          <a:p>
+            <a:pPr marL="432000" indent="-324000">
+              <a:spcAft>
+                <a:spcPts val="1414"/>
+              </a:spcAft>
+              <a:buClr>
+                <a:srgbClr val="ef2929"/>
+              </a:buClr>
+              <a:buSzPct val="45000"/>
+              <a:buFont typeface="Wingdings" charset="2"/>
+              <a:buChar char=""/>
+            </a:pPr>
+            <a:r>
+              <a:rPr b="0" lang="en-CA" sz="2800" spc="-1" strike="noStrike" u="sng">
+                <a:solidFill>
+                  <a:srgbClr val="333333"/>
+                </a:solidFill>
+                <a:uFillTx/>
+                <a:latin typeface="Noto Sans Regular"/>
+              </a:rPr>
+              <a:t>Motivation: </a:t>
+            </a:r>
+            <a:endParaRPr b="0" lang="en-CA" sz="2800" spc="-1" strike="noStrike">
+              <a:solidFill>
+                <a:srgbClr val="333333"/>
+              </a:solidFill>
+              <a:latin typeface="Noto Sans Regular"/>
+            </a:endParaRPr>
+          </a:p>
+          <a:p>
+            <a:pPr marL="432000" indent="-324000">
+              <a:spcAft>
+                <a:spcPts val="1414"/>
+              </a:spcAft>
+              <a:buClr>
+                <a:srgbClr val="ef2929"/>
+              </a:buClr>
+              <a:buSzPct val="45000"/>
+              <a:buFont typeface="Wingdings" charset="2"/>
+              <a:buChar char=""/>
+            </a:pPr>
+            <a:r>
+              <a:rPr b="0" lang="en-CA" sz="2800" spc="-1" strike="noStrike">
+                <a:solidFill>
+                  <a:srgbClr val="333333"/>
+                </a:solidFill>
+                <a:latin typeface="Noto Sans Regular"/>
+              </a:rPr>
+              <a:t>Real-world robotics experiments subject to high amounts of variability</a:t>
+            </a:r>
+            <a:endParaRPr b="0" lang="en-CA" sz="2800" spc="-1" strike="noStrike">
+              <a:solidFill>
+                <a:srgbClr val="333333"/>
+              </a:solidFill>
+              <a:latin typeface="Noto Sans Regular"/>
+            </a:endParaRPr>
+          </a:p>
+          <a:p>
+            <a:pPr marL="432000" indent="-324000">
+              <a:spcAft>
+                <a:spcPts val="1414"/>
+              </a:spcAft>
+              <a:buClr>
+                <a:srgbClr val="ef2929"/>
+              </a:buClr>
+              <a:buSzPct val="45000"/>
+              <a:buFont typeface="Wingdings" charset="2"/>
+              <a:buChar char=""/>
+            </a:pPr>
+            <a:r>
               <a:rPr b="0" lang="en-CA" sz="2800" spc="-1" strike="noStrike">
                 <a:solidFill>
                   <a:srgbClr val="333333"/>
@@ -7753,7 +7893,7 @@
       </p:sp>
       <p:graphicFrame>
         <p:nvGraphicFramePr>
-          <p:cNvPr id="167" name="Table 3"/>
+          <p:cNvPr id="169" name="Table 3"/>
           <p:cNvGraphicFramePr/>
           <p:nvPr/>
         </p:nvGraphicFramePr>
@@ -8030,7 +8170,7 @@
 </p:sld>
 </file>
 
-<file path=ppt/slides/slide23.xml><?xml version="1.0" encoding="utf-8"?>
+<file path=ppt/slides/slide24.xml><?xml version="1.0" encoding="utf-8"?>
 <p:sld xmlns:a="http://schemas.openxmlformats.org/drawingml/2006/main" xmlns:p="http://schemas.openxmlformats.org/presentationml/2006/main" xmlns:r="http://schemas.openxmlformats.org/officeDocument/2006/relationships" xmlns:p14="http://schemas.microsoft.com/office/powerpoint/2010/main" xmlns:p15="http://schemas.microsoft.com/office/powerpoint/2012/main" xmlns:mc="http://schemas.openxmlformats.org/markup-compatibility/2006">
   <p:cSld>
     <p:spTree>
@@ -8049,7 +8189,7 @@
       </p:grpSpPr>
       <p:pic>
         <p:nvPicPr>
-          <p:cNvPr id="168" name="" descr=""/>
+          <p:cNvPr id="170" name="" descr=""/>
           <p:cNvPicPr/>
           <p:nvPr/>
         </p:nvPicPr>
@@ -8072,7 +8212,7 @@
       </p:pic>
       <p:sp>
         <p:nvSpPr>
-          <p:cNvPr id="169" name="TextShape 1"/>
+          <p:cNvPr id="171" name="TextShape 1"/>
           <p:cNvSpPr txBox="1"/>
           <p:nvPr/>
         </p:nvSpPr>
@@ -8112,7 +8252,7 @@
       </p:sp>
       <p:sp>
         <p:nvSpPr>
-          <p:cNvPr id="170" name="TextShape 2"/>
+          <p:cNvPr id="172" name="TextShape 2"/>
           <p:cNvSpPr txBox="1"/>
           <p:nvPr/>
         </p:nvSpPr>
@@ -8265,7 +8405,7 @@
       </p:sp>
       <p:pic>
         <p:nvPicPr>
-          <p:cNvPr id="171" name="" descr=""/>
+          <p:cNvPr id="173" name="" descr=""/>
           <p:cNvPicPr/>
           <p:nvPr/>
         </p:nvPicPr>
@@ -8291,7 +8431,7 @@
 </p:sld>
 </file>
 
-<file path=ppt/slides/slide24.xml><?xml version="1.0" encoding="utf-8"?>
+<file path=ppt/slides/slide25.xml><?xml version="1.0" encoding="utf-8"?>
 <p:sld xmlns:a="http://schemas.openxmlformats.org/drawingml/2006/main" xmlns:p="http://schemas.openxmlformats.org/presentationml/2006/main" xmlns:r="http://schemas.openxmlformats.org/officeDocument/2006/relationships" xmlns:p14="http://schemas.microsoft.com/office/powerpoint/2010/main" xmlns:p15="http://schemas.microsoft.com/office/powerpoint/2012/main" xmlns:mc="http://schemas.openxmlformats.org/markup-compatibility/2006">
   <p:cSld>
     <p:spTree>
@@ -8310,7 +8450,7 @@
       </p:grpSpPr>
       <p:sp>
         <p:nvSpPr>
-          <p:cNvPr id="172" name="TextShape 1"/>
+          <p:cNvPr id="174" name="TextShape 1"/>
           <p:cNvSpPr txBox="1"/>
           <p:nvPr/>
         </p:nvSpPr>
@@ -8350,7 +8490,7 @@
       </p:sp>
       <p:sp>
         <p:nvSpPr>
-          <p:cNvPr id="173" name="TextShape 2"/>
+          <p:cNvPr id="175" name="TextShape 2"/>
           <p:cNvSpPr txBox="1"/>
           <p:nvPr/>
         </p:nvSpPr>
@@ -8448,7 +8588,7 @@
       </p:sp>
       <p:graphicFrame>
         <p:nvGraphicFramePr>
-          <p:cNvPr id="174" name="Table 3"/>
+          <p:cNvPr id="176" name="Table 3"/>
           <p:cNvGraphicFramePr/>
           <p:nvPr/>
         </p:nvGraphicFramePr>
@@ -8799,7 +8939,7 @@
 </p:sld>
 </file>
 
-<file path=ppt/slides/slide25.xml><?xml version="1.0" encoding="utf-8"?>
+<file path=ppt/slides/slide26.xml><?xml version="1.0" encoding="utf-8"?>
 <p:sld xmlns:a="http://schemas.openxmlformats.org/drawingml/2006/main" xmlns:p="http://schemas.openxmlformats.org/presentationml/2006/main" xmlns:r="http://schemas.openxmlformats.org/officeDocument/2006/relationships" xmlns:p14="http://schemas.microsoft.com/office/powerpoint/2010/main" xmlns:p15="http://schemas.microsoft.com/office/powerpoint/2012/main" xmlns:mc="http://schemas.openxmlformats.org/markup-compatibility/2006">
   <p:cSld>
     <p:spTree>
@@ -8818,7 +8958,7 @@
       </p:grpSpPr>
       <p:sp>
         <p:nvSpPr>
-          <p:cNvPr id="175" name="TextShape 1"/>
+          <p:cNvPr id="177" name="TextShape 1"/>
           <p:cNvSpPr txBox="1"/>
           <p:nvPr/>
         </p:nvSpPr>
@@ -8858,7 +8998,7 @@
       </p:sp>
       <p:graphicFrame>
         <p:nvGraphicFramePr>
-          <p:cNvPr id="176" name="Table 2"/>
+          <p:cNvPr id="178" name="Table 2"/>
           <p:cNvGraphicFramePr/>
           <p:nvPr/>
         </p:nvGraphicFramePr>
@@ -9490,14 +9630,14 @@
       </p:grpSpPr>
       <p:sp>
         <p:nvSpPr>
-          <p:cNvPr id="91" name="TextShape 1"/>
+          <p:cNvPr id="90" name="TextShape 1"/>
           <p:cNvSpPr txBox="1"/>
           <p:nvPr/>
         </p:nvSpPr>
         <p:spPr>
           <a:xfrm>
-            <a:off x="720000" y="279720"/>
-            <a:ext cx="8855640" cy="1305000"/>
+            <a:off x="720000" y="300960"/>
+            <a:ext cx="8855640" cy="1262520"/>
           </a:xfrm>
           <a:prstGeom prst="rect">
             <a:avLst/>
@@ -9517,7 +9657,7 @@
                 </a:solidFill>
                 <a:latin typeface="Noto Sans Regular"/>
               </a:rPr>
-              <a:t>Message Passing and Node Graph</a:t>
+              <a:t>What is ROS?</a:t>
             </a:r>
             <a:endParaRPr b="1" lang="en-CA" sz="4400" spc="-1" strike="noStrike">
               <a:solidFill>
@@ -9530,14 +9670,14 @@
       </p:sp>
       <p:sp>
         <p:nvSpPr>
-          <p:cNvPr id="92" name="TextShape 2"/>
+          <p:cNvPr id="91" name="TextShape 2"/>
           <p:cNvSpPr txBox="1"/>
           <p:nvPr/>
         </p:nvSpPr>
         <p:spPr>
           <a:xfrm>
-            <a:off x="432000" y="1735200"/>
-            <a:ext cx="9288000" cy="2080800"/>
+            <a:off x="576000" y="1800000"/>
+            <a:ext cx="8640000" cy="4384800"/>
           </a:xfrm>
           <a:prstGeom prst="rect">
             <a:avLst/>
@@ -9568,16 +9708,7 @@
                 </a:solidFill>
                 <a:latin typeface="Noto Sans Regular"/>
               </a:rPr>
-              <a:t>ROS application made up of collection of </a:t>
-            </a:r>
-            <a:r>
-              <a:rPr b="1" lang="en-CA" sz="2600" spc="-1" strike="noStrike">
-                <a:solidFill>
-                  <a:srgbClr val="333333"/>
-                </a:solidFill>
-                <a:latin typeface="Noto Sans Regular"/>
-              </a:rPr>
-              <a:t>nodes.</a:t>
+              <a:t>ROS is an open-source, meta-operating system for your robot. It provides the services you would expect from an operating system, including: </a:t>
             </a:r>
             <a:endParaRPr b="0" lang="en-CA" sz="2600" spc="-1" strike="noStrike">
               <a:solidFill>
@@ -9605,7 +9736,7 @@
                 </a:solidFill>
                 <a:latin typeface="Noto Sans Regular"/>
               </a:rPr>
-              <a:t>Nodes exchange messages in doucupled fashion via message constracts</a:t>
+              <a:t>message-passing between processes</a:t>
             </a:r>
             <a:endParaRPr b="0" lang="en-CA" sz="2600" spc="-1" strike="noStrike">
               <a:solidFill>
@@ -9626,6 +9757,15 @@
               <a:buFont typeface="Wingdings" charset="2"/>
               <a:buChar char=""/>
             </a:pPr>
+            <a:r>
+              <a:rPr b="0" lang="en-CA" sz="2600" spc="-1" strike="noStrike">
+                <a:solidFill>
+                  <a:srgbClr val="333333"/>
+                </a:solidFill>
+                <a:latin typeface="Noto Sans Regular"/>
+              </a:rPr>
+              <a:t>hardware abstraction</a:t>
+            </a:r>
             <a:endParaRPr b="0" lang="en-CA" sz="2600" spc="-1" strike="noStrike">
               <a:solidFill>
                 <a:srgbClr val="333333"/>
@@ -9633,40 +9773,149 @@
               <a:latin typeface="Noto Sans Regular"/>
             </a:endParaRPr>
           </a:p>
-        </p:txBody>
-      </p:sp>
-      <p:pic>
-        <p:nvPicPr>
-          <p:cNvPr id="93" name="" descr=""/>
-          <p:cNvPicPr/>
+          <a:p>
+            <a:pPr marL="432000" indent="-324000">
+              <a:spcAft>
+                <a:spcPts val="1414"/>
+              </a:spcAft>
+              <a:buClr>
+                <a:srgbClr val="ef2929"/>
+              </a:buClr>
+              <a:buSzPct val="45000"/>
+              <a:buFont typeface="Wingdings" charset="2"/>
+              <a:buChar char=""/>
+            </a:pPr>
+            <a:r>
+              <a:rPr b="0" lang="en-CA" sz="2600" spc="-1" strike="noStrike">
+                <a:solidFill>
+                  <a:srgbClr val="333333"/>
+                </a:solidFill>
+                <a:latin typeface="Noto Sans Regular"/>
+              </a:rPr>
+              <a:t>low-level device control</a:t>
+            </a:r>
+            <a:endParaRPr b="0" lang="en-CA" sz="2600" spc="-1" strike="noStrike">
+              <a:solidFill>
+                <a:srgbClr val="333333"/>
+              </a:solidFill>
+              <a:latin typeface="Noto Sans Regular"/>
+            </a:endParaRPr>
+          </a:p>
+          <a:p>
+            <a:pPr marL="432000" indent="-324000">
+              <a:spcAft>
+                <a:spcPts val="1414"/>
+              </a:spcAft>
+              <a:buClr>
+                <a:srgbClr val="ef2929"/>
+              </a:buClr>
+              <a:buSzPct val="45000"/>
+              <a:buFont typeface="Wingdings" charset="2"/>
+              <a:buChar char=""/>
+            </a:pPr>
+            <a:r>
+              <a:rPr b="0" lang="en-CA" sz="2600" spc="-1" strike="noStrike">
+                <a:solidFill>
+                  <a:srgbClr val="333333"/>
+                </a:solidFill>
+                <a:latin typeface="Noto Sans Regular"/>
+              </a:rPr>
+              <a:t>implementation of commonly-used functionality</a:t>
+            </a:r>
+            <a:endParaRPr b="0" lang="en-CA" sz="2600" spc="-1" strike="noStrike">
+              <a:solidFill>
+                <a:srgbClr val="333333"/>
+              </a:solidFill>
+              <a:latin typeface="Noto Sans Regular"/>
+            </a:endParaRPr>
+          </a:p>
+          <a:p>
+            <a:pPr marL="432000" indent="-324000">
+              <a:spcAft>
+                <a:spcPts val="1414"/>
+              </a:spcAft>
+              <a:buClr>
+                <a:srgbClr val="ef2929"/>
+              </a:buClr>
+              <a:buSzPct val="45000"/>
+              <a:buFont typeface="Wingdings" charset="2"/>
+              <a:buChar char=""/>
+            </a:pPr>
+            <a:r>
+              <a:rPr b="0" lang="en-CA" sz="2600" spc="-1" strike="noStrike">
+                <a:solidFill>
+                  <a:srgbClr val="333333"/>
+                </a:solidFill>
+                <a:latin typeface="Noto Sans Regular"/>
+              </a:rPr>
+              <a:t>package management</a:t>
+            </a:r>
+            <a:endParaRPr b="0" lang="en-CA" sz="2600" spc="-1" strike="noStrike">
+              <a:solidFill>
+                <a:srgbClr val="333333"/>
+              </a:solidFill>
+              <a:latin typeface="Noto Sans Regular"/>
+            </a:endParaRPr>
+          </a:p>
+        </p:txBody>
+      </p:sp>
+      <p:sp>
+        <p:nvSpPr>
+          <p:cNvPr id="92" name="TextShape 3"/>
+          <p:cNvSpPr txBox="1"/>
           <p:nvPr/>
-        </p:nvPicPr>
-        <p:blipFill>
-          <a:blip r:embed="rId1"/>
-          <a:stretch/>
-        </p:blipFill>
-        <p:spPr>
-          <a:xfrm>
-            <a:off x="864360" y="3772080"/>
-            <a:ext cx="8567640" cy="2923920"/>
-          </a:xfrm>
-          <a:prstGeom prst="rect">
-            <a:avLst/>
-          </a:prstGeom>
+        </p:nvSpPr>
+        <p:spPr>
+          <a:xfrm>
+            <a:off x="955440" y="5976000"/>
+            <a:ext cx="4300560" cy="360000"/>
+          </a:xfrm>
+          <a:prstGeom prst="rect">
+            <a:avLst/>
+          </a:prstGeom>
+          <a:noFill/>
           <a:ln>
             <a:noFill/>
           </a:ln>
         </p:spPr>
-      </p:pic>
+        <p:txBody>
+          <a:bodyPr lIns="90000" rIns="90000" tIns="45000" bIns="45000"/>
+          <a:p>
+            <a:r>
+              <a:rPr b="0" i="1" lang="en-CA" sz="1600" spc="-1" strike="noStrike" u="sng">
+                <a:uFillTx/>
+                <a:latin typeface="Arial"/>
+              </a:rPr>
+              <a:t>Source:</a:t>
+            </a:r>
+            <a:r>
+              <a:rPr b="0" lang="en-CA" sz="1600" spc="-1" strike="noStrike">
+                <a:latin typeface="Arial"/>
+              </a:rPr>
+              <a:t> </a:t>
+            </a:r>
+            <a:r>
+              <a:rPr b="0" lang="en-CA" sz="1600" spc="-1" strike="noStrike">
+                <a:latin typeface="Arial"/>
+                <a:hlinkClick r:id="rId1"/>
+              </a:rPr>
+              <a:t>http://wiki.ros.org/ROS/Introduction</a:t>
+            </a:r>
+            <a:endParaRPr b="0" lang="en-CA" sz="1600" spc="-1" strike="noStrike">
+              <a:latin typeface="Arial"/>
+            </a:endParaRPr>
+          </a:p>
+        </p:txBody>
+      </p:sp>
     </p:spTree>
   </p:cSld>
   <p:timing>
     <p:tnLst>
       <p:par>
-        <p:cTn id="5" dur="indefinite" restart="never" nodeType="tmRoot">
+        <p:cTn id="3" dur="indefinite" restart="never" nodeType="tmRoot">
           <p:childTnLst>
             <p:seq>
-              <p:cTn id="6" dur="indefinite" nodeType="mainSeq"/>
+              <p:cTn id="4" dur="indefinite" nodeType="mainSeq"/>
               <p:prevCondLst>
                 <p:cond delay="0" evt="onPrev">
                   <p:tgtEl>
@@ -9709,14 +9958,14 @@
       </p:grpSpPr>
       <p:sp>
         <p:nvSpPr>
-          <p:cNvPr id="94" name="TextShape 1"/>
+          <p:cNvPr id="93" name="TextShape 1"/>
           <p:cNvSpPr txBox="1"/>
           <p:nvPr/>
         </p:nvSpPr>
         <p:spPr>
           <a:xfrm>
-            <a:off x="720000" y="300960"/>
-            <a:ext cx="8855640" cy="1262520"/>
+            <a:off x="720000" y="279720"/>
+            <a:ext cx="8855640" cy="1305000"/>
           </a:xfrm>
           <a:prstGeom prst="rect">
             <a:avLst/>
@@ -9736,7 +9985,7 @@
                 </a:solidFill>
                 <a:latin typeface="Noto Sans Regular"/>
               </a:rPr>
-              <a:t>Hardware Abstraction</a:t>
+              <a:t>Message Passing and Node Graph</a:t>
             </a:r>
             <a:endParaRPr b="1" lang="en-CA" sz="4400" spc="-1" strike="noStrike">
               <a:solidFill>
@@ -9749,14 +9998,14 @@
       </p:sp>
       <p:sp>
         <p:nvSpPr>
-          <p:cNvPr id="95" name="TextShape 2"/>
+          <p:cNvPr id="94" name="TextShape 2"/>
           <p:cNvSpPr txBox="1"/>
           <p:nvPr/>
         </p:nvSpPr>
         <p:spPr>
           <a:xfrm>
-            <a:off x="576000" y="1512000"/>
-            <a:ext cx="8640000" cy="4384800"/>
+            <a:off x="432000" y="1735200"/>
+            <a:ext cx="9288000" cy="2080800"/>
           </a:xfrm>
           <a:prstGeom prst="rect">
             <a:avLst/>
@@ -9781,16 +10030,24 @@
               <a:buChar char=""/>
             </a:pPr>
             <a:r>
-              <a:rPr b="0" lang="en-CA" sz="2800" spc="-1" strike="noStrike" u="sng">
-                <a:solidFill>
-                  <a:srgbClr val="333333"/>
-                </a:solidFill>
-                <a:uFillTx/>
+              <a:rPr b="0" lang="en-CA" sz="2600" spc="-1" strike="noStrike">
+                <a:solidFill>
+                  <a:srgbClr val="333333"/>
+                </a:solidFill>
                 <a:latin typeface="Noto Sans Regular"/>
               </a:rPr>
-              <a:t>Goal:</a:t>
-            </a:r>
-            <a:endParaRPr b="0" lang="en-CA" sz="2800" spc="-1" strike="noStrike">
+              <a:t>ROS application made up of collection of </a:t>
+            </a:r>
+            <a:r>
+              <a:rPr b="1" lang="en-CA" sz="2600" spc="-1" strike="noStrike">
+                <a:solidFill>
+                  <a:srgbClr val="333333"/>
+                </a:solidFill>
+                <a:latin typeface="Noto Sans Regular"/>
+              </a:rPr>
+              <a:t>nodes.</a:t>
+            </a:r>
+            <a:endParaRPr b="0" lang="en-CA" sz="2600" spc="-1" strike="noStrike">
               <a:solidFill>
                 <a:srgbClr val="333333"/>
               </a:solidFill>
@@ -9810,15 +10067,15 @@
               <a:buChar char=""/>
             </a:pPr>
             <a:r>
-              <a:rPr b="0" lang="en-CA" sz="2800" spc="-1" strike="noStrike">
+              <a:rPr b="0" lang="en-CA" sz="2600" spc="-1" strike="noStrike">
                 <a:solidFill>
                   <a:srgbClr val="333333"/>
                 </a:solidFill>
                 <a:latin typeface="Noto Sans Regular"/>
               </a:rPr>
-              <a:t>User code should not change between simulation and real hardware.</a:t>
-            </a:r>
-            <a:endParaRPr b="0" lang="en-CA" sz="2800" spc="-1" strike="noStrike">
+              <a:t>Nodes exchange messages in decoupled fashion via message constracts</a:t>
+            </a:r>
+            <a:endParaRPr b="0" lang="en-CA" sz="2600" spc="-1" strike="noStrike">
               <a:solidFill>
                 <a:srgbClr val="333333"/>
               </a:solidFill>
@@ -9837,16 +10094,7 @@
               <a:buFont typeface="Wingdings" charset="2"/>
               <a:buChar char=""/>
             </a:pPr>
-            <a:r>
-              <a:rPr b="0" lang="en-CA" sz="2800" spc="-1" strike="noStrike">
-                <a:solidFill>
-                  <a:srgbClr val="333333"/>
-                </a:solidFill>
-                <a:latin typeface="Noto Sans Regular"/>
-              </a:rPr>
-              <a:t>Because working off common message types, interface remains unchanged</a:t>
-            </a:r>
-            <a:endParaRPr b="0" lang="en-CA" sz="2800" spc="-1" strike="noStrike">
+            <a:endParaRPr b="0" lang="en-CA" sz="2600" spc="-1" strike="noStrike">
               <a:solidFill>
                 <a:srgbClr val="333333"/>
               </a:solidFill>
@@ -9857,7 +10105,7 @@
       </p:sp>
       <p:pic>
         <p:nvPicPr>
-          <p:cNvPr id="96" name="" descr=""/>
+          <p:cNvPr id="95" name="" descr=""/>
           <p:cNvPicPr/>
           <p:nvPr/>
         </p:nvPicPr>
@@ -9867,8 +10115,8 @@
         </p:blipFill>
         <p:spPr>
           <a:xfrm>
-            <a:off x="3593160" y="4032000"/>
-            <a:ext cx="3246840" cy="3252600"/>
+            <a:off x="864360" y="3772080"/>
+            <a:ext cx="8567640" cy="2923920"/>
           </a:xfrm>
           <a:prstGeom prst="rect">
             <a:avLst/>
@@ -9883,10 +10131,10 @@
   <p:timing>
     <p:tnLst>
       <p:par>
-        <p:cTn id="7" dur="indefinite" restart="never" nodeType="tmRoot">
+        <p:cTn id="5" dur="indefinite" restart="never" nodeType="tmRoot">
           <p:childTnLst>
             <p:seq>
-              <p:cTn id="8" dur="indefinite" nodeType="mainSeq"/>
+              <p:cTn id="6" dur="indefinite" nodeType="mainSeq"/>
               <p:prevCondLst>
                 <p:cond delay="0" evt="onPrev">
                   <p:tgtEl>
@@ -9929,7 +10177,7 @@
       </p:grpSpPr>
       <p:sp>
         <p:nvSpPr>
-          <p:cNvPr id="97" name="TextShape 1"/>
+          <p:cNvPr id="96" name="TextShape 1"/>
           <p:cNvSpPr txBox="1"/>
           <p:nvPr/>
         </p:nvSpPr>
@@ -9956,7 +10204,7 @@
                 </a:solidFill>
                 <a:latin typeface="Noto Sans Regular"/>
               </a:rPr>
-              <a:t>Master Node</a:t>
+              <a:t>Hardware Abstraction</a:t>
             </a:r>
             <a:endParaRPr b="1" lang="en-CA" sz="4400" spc="-1" strike="noStrike">
               <a:solidFill>
@@ -9969,13 +10217,13 @@
       </p:sp>
       <p:sp>
         <p:nvSpPr>
-          <p:cNvPr id="98" name="TextShape 2"/>
+          <p:cNvPr id="97" name="TextShape 2"/>
           <p:cNvSpPr txBox="1"/>
           <p:nvPr/>
         </p:nvSpPr>
         <p:spPr>
           <a:xfrm>
-            <a:off x="576000" y="1591200"/>
+            <a:off x="576000" y="1512000"/>
             <a:ext cx="8640000" cy="4384800"/>
           </a:xfrm>
           <a:prstGeom prst="rect">
@@ -10001,15 +10249,16 @@
               <a:buChar char=""/>
             </a:pPr>
             <a:r>
-              <a:rPr b="0" lang="en-CA" sz="2600" spc="-1" strike="noStrike">
-                <a:solidFill>
-                  <a:srgbClr val="333333"/>
-                </a:solidFill>
+              <a:rPr b="0" lang="en-CA" sz="2800" spc="-1" strike="noStrike" u="sng">
+                <a:solidFill>
+                  <a:srgbClr val="333333"/>
+                </a:solidFill>
+                <a:uFillTx/>
                 <a:latin typeface="Noto Sans Regular"/>
               </a:rPr>
-              <a:t>Master node responsible for registry and lookup of other nodes</a:t>
-            </a:r>
-            <a:endParaRPr b="0" lang="en-CA" sz="2600" spc="-1" strike="noStrike">
+              <a:t>Goal:</a:t>
+            </a:r>
+            <a:endParaRPr b="0" lang="en-CA" sz="2800" spc="-1" strike="noStrike">
               <a:solidFill>
                 <a:srgbClr val="333333"/>
               </a:solidFill>
@@ -10029,15 +10278,15 @@
               <a:buChar char=""/>
             </a:pPr>
             <a:r>
-              <a:rPr b="0" lang="en-CA" sz="2600" spc="-1" strike="noStrike">
+              <a:rPr b="0" lang="en-CA" sz="2800" spc="-1" strike="noStrike">
                 <a:solidFill>
                   <a:srgbClr val="333333"/>
                 </a:solidFill>
                 <a:latin typeface="Noto Sans Regular"/>
               </a:rPr>
-              <a:t>Enables other ROS nodes to locate eachother</a:t>
-            </a:r>
-            <a:endParaRPr b="0" lang="en-CA" sz="2600" spc="-1" strike="noStrike">
+              <a:t>User code should not change between simulation and real hardware.</a:t>
+            </a:r>
+            <a:endParaRPr b="0" lang="en-CA" sz="2800" spc="-1" strike="noStrike">
               <a:solidFill>
                 <a:srgbClr val="333333"/>
               </a:solidFill>
@@ -10057,21 +10306,156 @@
               <a:buChar char=""/>
             </a:pPr>
             <a:r>
-              <a:rPr b="0" lang="en-CA" sz="2600" spc="-1" strike="noStrike">
+              <a:rPr b="0" lang="en-CA" sz="2800" spc="-1" strike="noStrike">
                 <a:solidFill>
                   <a:srgbClr val="333333"/>
                 </a:solidFill>
                 <a:latin typeface="Noto Sans Regular"/>
               </a:rPr>
-              <a:t>Once nodes have located eachother, communiate peer-to-peer</a:t>
-            </a:r>
-            <a:endParaRPr b="0" lang="en-CA" sz="2600" spc="-1" strike="noStrike">
-              <a:solidFill>
-                <a:srgbClr val="333333"/>
-              </a:solidFill>
-              <a:latin typeface="Noto Sans Regular"/>
-            </a:endParaRPr>
-          </a:p>
+              <a:t>Because working off common message types, interface remains unchanged</a:t>
+            </a:r>
+            <a:endParaRPr b="0" lang="en-CA" sz="2800" spc="-1" strike="noStrike">
+              <a:solidFill>
+                <a:srgbClr val="333333"/>
+              </a:solidFill>
+              <a:latin typeface="Noto Sans Regular"/>
+            </a:endParaRPr>
+          </a:p>
+        </p:txBody>
+      </p:sp>
+      <p:pic>
+        <p:nvPicPr>
+          <p:cNvPr id="98" name="" descr=""/>
+          <p:cNvPicPr/>
+          <p:nvPr/>
+        </p:nvPicPr>
+        <p:blipFill>
+          <a:blip r:embed="rId1"/>
+          <a:stretch/>
+        </p:blipFill>
+        <p:spPr>
+          <a:xfrm>
+            <a:off x="3593160" y="4032000"/>
+            <a:ext cx="3246840" cy="3252600"/>
+          </a:xfrm>
+          <a:prstGeom prst="rect">
+            <a:avLst/>
+          </a:prstGeom>
+          <a:ln>
+            <a:noFill/>
+          </a:ln>
+        </p:spPr>
+      </p:pic>
+    </p:spTree>
+  </p:cSld>
+  <p:timing>
+    <p:tnLst>
+      <p:par>
+        <p:cTn id="7" dur="indefinite" restart="never" nodeType="tmRoot">
+          <p:childTnLst>
+            <p:seq>
+              <p:cTn id="8" dur="indefinite" nodeType="mainSeq"/>
+              <p:prevCondLst>
+                <p:cond delay="0" evt="onPrev">
+                  <p:tgtEl>
+                    <p:sldTgt/>
+                  </p:tgtEl>
+                </p:cond>
+              </p:prevCondLst>
+              <p:nextCondLst>
+                <p:cond delay="0" evt="onNext">
+                  <p:tgtEl>
+                    <p:sldTgt/>
+                  </p:tgtEl>
+                </p:cond>
+              </p:nextCondLst>
+            </p:seq>
+          </p:childTnLst>
+        </p:cTn>
+      </p:par>
+    </p:tnLst>
+  </p:timing>
+</p:sld>
+</file>
+
+<file path=ppt/slides/slide6.xml><?xml version="1.0" encoding="utf-8"?>
+<p:sld xmlns:a="http://schemas.openxmlformats.org/drawingml/2006/main" xmlns:p="http://schemas.openxmlformats.org/presentationml/2006/main" xmlns:r="http://schemas.openxmlformats.org/officeDocument/2006/relationships" xmlns:p14="http://schemas.microsoft.com/office/powerpoint/2010/main" xmlns:p15="http://schemas.microsoft.com/office/powerpoint/2012/main" xmlns:mc="http://schemas.openxmlformats.org/markup-compatibility/2006">
+  <p:cSld>
+    <p:spTree>
+      <p:nvGrpSpPr>
+        <p:cNvPr id="1" name=""/>
+        <p:cNvGrpSpPr/>
+        <p:nvPr/>
+      </p:nvGrpSpPr>
+      <p:grpSpPr>
+        <a:xfrm>
+          <a:off x="0" y="0"/>
+          <a:ext cx="0" cy="0"/>
+          <a:chOff x="0" y="0"/>
+          <a:chExt cx="0" cy="0"/>
+        </a:xfrm>
+      </p:grpSpPr>
+      <p:sp>
+        <p:nvSpPr>
+          <p:cNvPr id="99" name="TextShape 1"/>
+          <p:cNvSpPr txBox="1"/>
+          <p:nvPr/>
+        </p:nvSpPr>
+        <p:spPr>
+          <a:xfrm>
+            <a:off x="720000" y="300960"/>
+            <a:ext cx="8855640" cy="1262520"/>
+          </a:xfrm>
+          <a:prstGeom prst="rect">
+            <a:avLst/>
+          </a:prstGeom>
+          <a:noFill/>
+          <a:ln>
+            <a:noFill/>
+          </a:ln>
+        </p:spPr>
+        <p:txBody>
+          <a:bodyPr lIns="0" rIns="0" tIns="0" bIns="0" anchor="ctr"/>
+          <a:p>
+            <a:r>
+              <a:rPr b="1" lang="en-CA" sz="4400" spc="-1" strike="noStrike">
+                <a:solidFill>
+                  <a:srgbClr val="333333"/>
+                </a:solidFill>
+                <a:latin typeface="Noto Sans Regular"/>
+              </a:rPr>
+              <a:t>Master Node</a:t>
+            </a:r>
+            <a:endParaRPr b="1" lang="en-CA" sz="4400" spc="-1" strike="noStrike">
+              <a:solidFill>
+                <a:srgbClr val="333333"/>
+              </a:solidFill>
+              <a:latin typeface="Noto Sans Regular"/>
+            </a:endParaRPr>
+          </a:p>
+        </p:txBody>
+      </p:sp>
+      <p:sp>
+        <p:nvSpPr>
+          <p:cNvPr id="100" name="TextShape 2"/>
+          <p:cNvSpPr txBox="1"/>
+          <p:nvPr/>
+        </p:nvSpPr>
+        <p:spPr>
+          <a:xfrm>
+            <a:off x="576000" y="1591200"/>
+            <a:ext cx="8640000" cy="4384800"/>
+          </a:xfrm>
+          <a:prstGeom prst="rect">
+            <a:avLst/>
+          </a:prstGeom>
+          <a:noFill/>
+          <a:ln>
+            <a:noFill/>
+          </a:ln>
+        </p:spPr>
+        <p:txBody>
+          <a:bodyPr lIns="0" rIns="0" tIns="0" bIns="0"/>
           <a:p>
             <a:pPr marL="432000" indent="-324000">
               <a:spcAft>
@@ -10085,6 +10469,90 @@
               <a:buChar char=""/>
             </a:pPr>
             <a:r>
+              <a:rPr b="0" lang="en-CA" sz="2600" spc="-1" strike="noStrike">
+                <a:solidFill>
+                  <a:srgbClr val="333333"/>
+                </a:solidFill>
+                <a:latin typeface="Noto Sans Regular"/>
+              </a:rPr>
+              <a:t>Master node responsible for registry and lookup of other nodes</a:t>
+            </a:r>
+            <a:endParaRPr b="0" lang="en-CA" sz="2600" spc="-1" strike="noStrike">
+              <a:solidFill>
+                <a:srgbClr val="333333"/>
+              </a:solidFill>
+              <a:latin typeface="Noto Sans Regular"/>
+            </a:endParaRPr>
+          </a:p>
+          <a:p>
+            <a:pPr marL="432000" indent="-324000">
+              <a:spcAft>
+                <a:spcPts val="1414"/>
+              </a:spcAft>
+              <a:buClr>
+                <a:srgbClr val="ef2929"/>
+              </a:buClr>
+              <a:buSzPct val="45000"/>
+              <a:buFont typeface="Wingdings" charset="2"/>
+              <a:buChar char=""/>
+            </a:pPr>
+            <a:r>
+              <a:rPr b="0" lang="en-CA" sz="2600" spc="-1" strike="noStrike">
+                <a:solidFill>
+                  <a:srgbClr val="333333"/>
+                </a:solidFill>
+                <a:latin typeface="Noto Sans Regular"/>
+              </a:rPr>
+              <a:t>Enables other ROS nodes to locate eachother</a:t>
+            </a:r>
+            <a:endParaRPr b="0" lang="en-CA" sz="2600" spc="-1" strike="noStrike">
+              <a:solidFill>
+                <a:srgbClr val="333333"/>
+              </a:solidFill>
+              <a:latin typeface="Noto Sans Regular"/>
+            </a:endParaRPr>
+          </a:p>
+          <a:p>
+            <a:pPr marL="432000" indent="-324000">
+              <a:spcAft>
+                <a:spcPts val="1414"/>
+              </a:spcAft>
+              <a:buClr>
+                <a:srgbClr val="ef2929"/>
+              </a:buClr>
+              <a:buSzPct val="45000"/>
+              <a:buFont typeface="Wingdings" charset="2"/>
+              <a:buChar char=""/>
+            </a:pPr>
+            <a:r>
+              <a:rPr b="0" lang="en-CA" sz="2600" spc="-1" strike="noStrike">
+                <a:solidFill>
+                  <a:srgbClr val="333333"/>
+                </a:solidFill>
+                <a:latin typeface="Noto Sans Regular"/>
+              </a:rPr>
+              <a:t>Once nodes have located eachother, communiate peer-to-peer</a:t>
+            </a:r>
+            <a:endParaRPr b="0" lang="en-CA" sz="2600" spc="-1" strike="noStrike">
+              <a:solidFill>
+                <a:srgbClr val="333333"/>
+              </a:solidFill>
+              <a:latin typeface="Noto Sans Regular"/>
+            </a:endParaRPr>
+          </a:p>
+          <a:p>
+            <a:pPr marL="432000" indent="-324000">
+              <a:spcAft>
+                <a:spcPts val="1414"/>
+              </a:spcAft>
+              <a:buClr>
+                <a:srgbClr val="ef2929"/>
+              </a:buClr>
+              <a:buSzPct val="45000"/>
+              <a:buFont typeface="Wingdings" charset="2"/>
+              <a:buChar char=""/>
+            </a:pPr>
+            <a:r>
               <a:rPr b="1" lang="en-CA" sz="2600" spc="-1" strike="noStrike">
                 <a:solidFill>
                   <a:srgbClr val="333333"/>
@@ -10113,7 +10581,7 @@
       </p:sp>
       <p:sp>
         <p:nvSpPr>
-          <p:cNvPr id="99" name="TextShape 3"/>
+          <p:cNvPr id="101" name="TextShape 3"/>
           <p:cNvSpPr txBox="1"/>
           <p:nvPr/>
         </p:nvSpPr>
@@ -10161,7 +10629,7 @@
       </p:sp>
       <p:pic>
         <p:nvPicPr>
-          <p:cNvPr id="100" name="" descr=""/>
+          <p:cNvPr id="102" name="" descr=""/>
           <p:cNvPicPr/>
           <p:nvPr/>
         </p:nvPicPr>
@@ -10184,7 +10652,7 @@
       </p:pic>
       <p:pic>
         <p:nvPicPr>
-          <p:cNvPr id="101" name="" descr=""/>
+          <p:cNvPr id="103" name="" descr=""/>
           <p:cNvPicPr/>
           <p:nvPr/>
         </p:nvPicPr>
@@ -10207,7 +10675,7 @@
       </p:pic>
       <p:pic>
         <p:nvPicPr>
-          <p:cNvPr id="102" name="" descr=""/>
+          <p:cNvPr id="104" name="" descr=""/>
           <p:cNvPicPr/>
           <p:nvPr/>
         </p:nvPicPr>
@@ -10230,7 +10698,7 @@
       </p:pic>
       <p:sp>
         <p:nvSpPr>
-          <p:cNvPr id="103" name="CustomShape 4"/>
+          <p:cNvPr id="105" name="CustomShape 4"/>
           <p:cNvSpPr/>
           <p:nvPr/>
         </p:nvSpPr>
@@ -10291,7 +10759,7 @@
       </p:sp>
       <p:sp>
         <p:nvSpPr>
-          <p:cNvPr id="104" name="CustomShape 5"/>
+          <p:cNvPr id="106" name="CustomShape 5"/>
           <p:cNvSpPr/>
           <p:nvPr/>
         </p:nvSpPr>
@@ -10382,7 +10850,7 @@
 </p:sld>
 </file>
 
-<file path=ppt/slides/slide6.xml><?xml version="1.0" encoding="utf-8"?>
+<file path=ppt/slides/slide7.xml><?xml version="1.0" encoding="utf-8"?>
 <p:sld xmlns:a="http://schemas.openxmlformats.org/drawingml/2006/main" xmlns:p="http://schemas.openxmlformats.org/presentationml/2006/main" xmlns:r="http://schemas.openxmlformats.org/officeDocument/2006/relationships" xmlns:p14="http://schemas.microsoft.com/office/powerpoint/2010/main" xmlns:p15="http://schemas.microsoft.com/office/powerpoint/2012/main" xmlns:mc="http://schemas.openxmlformats.org/markup-compatibility/2006">
   <p:cSld>
     <p:spTree>
@@ -10401,7 +10869,7 @@
       </p:grpSpPr>
       <p:sp>
         <p:nvSpPr>
-          <p:cNvPr id="105" name="TextShape 1"/>
+          <p:cNvPr id="107" name="TextShape 1"/>
           <p:cNvSpPr txBox="1"/>
           <p:nvPr/>
         </p:nvSpPr>
@@ -10441,7 +10909,7 @@
       </p:sp>
       <p:sp>
         <p:nvSpPr>
-          <p:cNvPr id="106" name="TextShape 2"/>
+          <p:cNvPr id="108" name="TextShape 2"/>
           <p:cNvSpPr txBox="1"/>
           <p:nvPr/>
         </p:nvSpPr>
@@ -10520,7 +10988,7 @@
       </p:sp>
       <p:pic>
         <p:nvPicPr>
-          <p:cNvPr id="107" name="" descr=""/>
+          <p:cNvPr id="109" name="" descr=""/>
           <p:cNvPicPr/>
           <p:nvPr/>
         </p:nvPicPr>
@@ -10573,7 +11041,7 @@
 </p:sld>
 </file>
 
-<file path=ppt/slides/slide7.xml><?xml version="1.0" encoding="utf-8"?>
+<file path=ppt/slides/slide8.xml><?xml version="1.0" encoding="utf-8"?>
 <p:sld xmlns:a="http://schemas.openxmlformats.org/drawingml/2006/main" xmlns:p="http://schemas.openxmlformats.org/presentationml/2006/main" xmlns:r="http://schemas.openxmlformats.org/officeDocument/2006/relationships" xmlns:p14="http://schemas.microsoft.com/office/powerpoint/2010/main" xmlns:p15="http://schemas.microsoft.com/office/powerpoint/2012/main" xmlns:mc="http://schemas.openxmlformats.org/markup-compatibility/2006">
   <p:cSld>
     <p:spTree>
@@ -10592,7 +11060,7 @@
       </p:grpSpPr>
       <p:sp>
         <p:nvSpPr>
-          <p:cNvPr id="108" name="TextShape 1"/>
+          <p:cNvPr id="110" name="TextShape 1"/>
           <p:cNvSpPr txBox="1"/>
           <p:nvPr/>
         </p:nvSpPr>
@@ -10632,7 +11100,7 @@
       </p:sp>
       <p:sp>
         <p:nvSpPr>
-          <p:cNvPr id="109" name="TextShape 2"/>
+          <p:cNvPr id="111" name="TextShape 2"/>
           <p:cNvSpPr txBox="1"/>
           <p:nvPr/>
         </p:nvSpPr>
@@ -10711,7 +11179,7 @@
       </p:sp>
       <p:graphicFrame>
         <p:nvGraphicFramePr>
-          <p:cNvPr id="110" name="Table 3"/>
+          <p:cNvPr id="112" name="Table 3"/>
           <p:cNvGraphicFramePr/>
           <p:nvPr/>
         </p:nvGraphicFramePr>
@@ -11264,7 +11732,7 @@
 </p:sld>
 </file>
 
-<file path=ppt/slides/slide8.xml><?xml version="1.0" encoding="utf-8"?>
+<file path=ppt/slides/slide9.xml><?xml version="1.0" encoding="utf-8"?>
 <p:sld xmlns:a="http://schemas.openxmlformats.org/drawingml/2006/main" xmlns:p="http://schemas.openxmlformats.org/presentationml/2006/main" xmlns:r="http://schemas.openxmlformats.org/officeDocument/2006/relationships" xmlns:p14="http://schemas.microsoft.com/office/powerpoint/2010/main" xmlns:p15="http://schemas.microsoft.com/office/powerpoint/2012/main" xmlns:mc="http://schemas.openxmlformats.org/markup-compatibility/2006">
   <p:cSld>
     <p:spTree>
@@ -11283,7 +11751,7 @@
       </p:grpSpPr>
       <p:sp>
         <p:nvSpPr>
-          <p:cNvPr id="111" name="TextShape 1"/>
+          <p:cNvPr id="113" name="TextShape 1"/>
           <p:cNvSpPr txBox="1"/>
           <p:nvPr/>
         </p:nvSpPr>
@@ -11323,7 +11791,7 @@
       </p:sp>
       <p:sp>
         <p:nvSpPr>
-          <p:cNvPr id="112" name="TextShape 2"/>
+          <p:cNvPr id="114" name="TextShape 2"/>
           <p:cNvSpPr txBox="1"/>
           <p:nvPr/>
         </p:nvSpPr>
@@ -11430,7 +11898,7 @@
       </p:sp>
       <p:pic>
         <p:nvPicPr>
-          <p:cNvPr id="113" name="" descr=""/>
+          <p:cNvPr id="115" name="" descr=""/>
           <p:cNvPicPr/>
           <p:nvPr/>
         </p:nvPicPr>
@@ -11480,188 +11948,6 @@
       </p:par>
     </p:tnLst>
   </p:timing>
-</p:sld>
-</file>
-
-<file path=ppt/slides/slide9.xml><?xml version="1.0" encoding="utf-8"?>
-<p:sld xmlns:a="http://schemas.openxmlformats.org/drawingml/2006/main" xmlns:p="http://schemas.openxmlformats.org/presentationml/2006/main" xmlns:r="http://schemas.openxmlformats.org/officeDocument/2006/relationships" xmlns:p14="http://schemas.microsoft.com/office/powerpoint/2010/main" xmlns:p15="http://schemas.microsoft.com/office/powerpoint/2012/main" xmlns:mc="http://schemas.openxmlformats.org/markup-compatibility/2006">
-  <p:cSld>
-    <p:spTree>
-      <p:nvGrpSpPr>
-        <p:cNvPr id="1" name=""/>
-        <p:cNvGrpSpPr/>
-        <p:nvPr/>
-      </p:nvGrpSpPr>
-      <p:grpSpPr>
-        <a:xfrm>
-          <a:off x="0" y="0"/>
-          <a:ext cx="0" cy="0"/>
-          <a:chOff x="0" y="0"/>
-          <a:chExt cx="0" cy="0"/>
-        </a:xfrm>
-      </p:grpSpPr>
-      <p:sp>
-        <p:nvSpPr>
-          <p:cNvPr id="114" name="TextShape 1"/>
-          <p:cNvSpPr txBox="1"/>
-          <p:nvPr/>
-        </p:nvSpPr>
-        <p:spPr>
-          <a:xfrm>
-            <a:off x="720000" y="300960"/>
-            <a:ext cx="8855640" cy="1262520"/>
-          </a:xfrm>
-          <a:prstGeom prst="rect">
-            <a:avLst/>
-          </a:prstGeom>
-          <a:noFill/>
-          <a:ln>
-            <a:noFill/>
-          </a:ln>
-        </p:spPr>
-        <p:txBody>
-          <a:bodyPr lIns="0" rIns="0" tIns="0" bIns="0" anchor="ctr"/>
-          <a:p>
-            <a:r>
-              <a:rPr b="1" lang="en-CA" sz="4400" spc="-1" strike="noStrike">
-                <a:solidFill>
-                  <a:srgbClr val="333333"/>
-                </a:solidFill>
-                <a:latin typeface="Noto Sans Regular"/>
-              </a:rPr>
-              <a:t>Services</a:t>
-            </a:r>
-            <a:endParaRPr b="1" lang="en-CA" sz="4400" spc="-1" strike="noStrike">
-              <a:solidFill>
-                <a:srgbClr val="333333"/>
-              </a:solidFill>
-              <a:latin typeface="Noto Sans Regular"/>
-            </a:endParaRPr>
-          </a:p>
-        </p:txBody>
-      </p:sp>
-      <p:sp>
-        <p:nvSpPr>
-          <p:cNvPr id="115" name="TextShape 2"/>
-          <p:cNvSpPr txBox="1"/>
-          <p:nvPr/>
-        </p:nvSpPr>
-        <p:spPr>
-          <a:xfrm>
-            <a:off x="504000" y="1563480"/>
-            <a:ext cx="9216000" cy="1604520"/>
-          </a:xfrm>
-          <a:prstGeom prst="rect">
-            <a:avLst/>
-          </a:prstGeom>
-          <a:noFill/>
-          <a:ln>
-            <a:noFill/>
-          </a:ln>
-        </p:spPr>
-        <p:txBody>
-          <a:bodyPr lIns="0" rIns="0" tIns="0" bIns="0"/>
-          <a:p>
-            <a:pPr marL="432000" indent="-324000">
-              <a:spcAft>
-                <a:spcPts val="1414"/>
-              </a:spcAft>
-              <a:buClr>
-                <a:srgbClr val="ef2929"/>
-              </a:buClr>
-              <a:buSzPct val="45000"/>
-              <a:buFont typeface="Wingdings" charset="2"/>
-              <a:buChar char=""/>
-            </a:pPr>
-            <a:r>
-              <a:rPr b="0" lang="en-CA" sz="2600" spc="-1" strike="noStrike">
-                <a:solidFill>
-                  <a:srgbClr val="333333"/>
-                </a:solidFill>
-                <a:latin typeface="Noto Sans Regular"/>
-              </a:rPr>
-              <a:t>Request / Response communication paradigm</a:t>
-            </a:r>
-            <a:endParaRPr b="0" lang="en-CA" sz="2600" spc="-1" strike="noStrike">
-              <a:solidFill>
-                <a:srgbClr val="333333"/>
-              </a:solidFill>
-              <a:latin typeface="Noto Sans Regular"/>
-            </a:endParaRPr>
-          </a:p>
-          <a:p>
-            <a:pPr marL="432000" indent="-324000">
-              <a:spcAft>
-                <a:spcPts val="1414"/>
-              </a:spcAft>
-              <a:buClr>
-                <a:srgbClr val="ef2929"/>
-              </a:buClr>
-              <a:buSzPct val="45000"/>
-              <a:buFont typeface="Wingdings" charset="2"/>
-              <a:buChar char=""/>
-            </a:pPr>
-            <a:r>
-              <a:rPr b="0" lang="en-CA" sz="2600" spc="-1" strike="noStrike">
-                <a:solidFill>
-                  <a:srgbClr val="333333"/>
-                </a:solidFill>
-                <a:latin typeface="Noto Sans Regular"/>
-              </a:rPr>
-              <a:t>Request will </a:t>
-            </a:r>
-            <a:r>
-              <a:rPr b="1" lang="en-CA" sz="2600" spc="-1" strike="noStrike">
-                <a:solidFill>
-                  <a:srgbClr val="333333"/>
-                </a:solidFill>
-                <a:latin typeface="Noto Sans Regular"/>
-              </a:rPr>
-              <a:t>block</a:t>
-            </a:r>
-            <a:r>
-              <a:rPr b="0" lang="en-CA" sz="2600" spc="-1" strike="noStrike">
-                <a:solidFill>
-                  <a:srgbClr val="333333"/>
-                </a:solidFill>
-                <a:latin typeface="Noto Sans Regular"/>
-              </a:rPr>
-              <a:t> will response is received</a:t>
-            </a:r>
-            <a:endParaRPr b="0" lang="en-CA" sz="2600" spc="-1" strike="noStrike">
-              <a:solidFill>
-                <a:srgbClr val="333333"/>
-              </a:solidFill>
-              <a:latin typeface="Noto Sans Regular"/>
-            </a:endParaRPr>
-          </a:p>
-        </p:txBody>
-      </p:sp>
-      <p:pic>
-        <p:nvPicPr>
-          <p:cNvPr id="116" name="" descr=""/>
-          <p:cNvPicPr/>
-          <p:nvPr/>
-        </p:nvPicPr>
-        <p:blipFill>
-          <a:blip r:embed="rId1"/>
-          <a:stretch/>
-        </p:blipFill>
-        <p:spPr>
-          <a:xfrm rot="21588000">
-            <a:off x="2238120" y="3106440"/>
-            <a:ext cx="6092280" cy="3590640"/>
-          </a:xfrm>
-          <a:prstGeom prst="rect">
-            <a:avLst/>
-          </a:prstGeom>
-          <a:ln>
-            <a:noFill/>
-          </a:ln>
-        </p:spPr>
-      </p:pic>
-    </p:spTree>
-  </p:cSld>
 </p:sld>
 </file>
 

</xml_diff>